<commit_message>
Update Beginner Level for Android Development using Kotlin - Module 1.pptx
</commit_message>
<xml_diff>
--- a/Beginner Level for Android Development using Kotlin - Module 1.pptx
+++ b/Beginner Level for Android Development using Kotlin - Module 1.pptx
@@ -2135,7 +2135,7 @@
   <p:cSld>
     <p:spTree>
       <p:nvGrpSpPr>
-        <p:cNvPr id="294" name="Shape 294"/>
+        <p:cNvPr id="295" name="Shape 295"/>
         <p:cNvGrpSpPr/>
         <p:nvPr/>
       </p:nvGrpSpPr>
@@ -2149,7 +2149,7 @@
       </p:grpSpPr>
       <p:sp>
         <p:nvSpPr>
-          <p:cNvPr id="295" name="Google Shape;295;gcb913f6704_0_166:notes"/>
+          <p:cNvPr id="296" name="Google Shape;296;gcb913f6704_0_166:notes"/>
           <p:cNvSpPr/>
           <p:nvPr>
             <p:ph idx="2" type="sldImg"/>
@@ -2184,7 +2184,7 @@
       </p:sp>
       <p:sp>
         <p:nvSpPr>
-          <p:cNvPr id="296" name="Google Shape;296;gcb913f6704_0_166:notes"/>
+          <p:cNvPr id="297" name="Google Shape;297;gcb913f6704_0_166:notes"/>
           <p:cNvSpPr txBox="1"/>
           <p:nvPr>
             <p:ph idx="1" type="body"/>
@@ -2234,7 +2234,7 @@
   <p:cSld>
     <p:spTree>
       <p:nvGrpSpPr>
-        <p:cNvPr id="313" name="Shape 313"/>
+        <p:cNvPr id="315" name="Shape 315"/>
         <p:cNvGrpSpPr/>
         <p:nvPr/>
       </p:nvGrpSpPr>
@@ -2248,7 +2248,7 @@
       </p:grpSpPr>
       <p:sp>
         <p:nvSpPr>
-          <p:cNvPr id="314" name="Google Shape;314;gcb913f6704_0_175:notes"/>
+          <p:cNvPr id="316" name="Google Shape;316;gcb913f6704_0_175:notes"/>
           <p:cNvSpPr/>
           <p:nvPr>
             <p:ph idx="2" type="sldImg"/>
@@ -2283,7 +2283,7 @@
       </p:sp>
       <p:sp>
         <p:nvSpPr>
-          <p:cNvPr id="315" name="Google Shape;315;gcb913f6704_0_175:notes"/>
+          <p:cNvPr id="317" name="Google Shape;317;gcb913f6704_0_175:notes"/>
           <p:cNvSpPr txBox="1"/>
           <p:nvPr>
             <p:ph idx="1" type="body"/>
@@ -2333,7 +2333,7 @@
   <p:cSld>
     <p:spTree>
       <p:nvGrpSpPr>
-        <p:cNvPr id="327" name="Shape 327"/>
+        <p:cNvPr id="329" name="Shape 329"/>
         <p:cNvGrpSpPr/>
         <p:nvPr/>
       </p:nvGrpSpPr>
@@ -2347,7 +2347,7 @@
       </p:grpSpPr>
       <p:sp>
         <p:nvSpPr>
-          <p:cNvPr id="328" name="Google Shape;328;gcb913f6704_0_390:notes"/>
+          <p:cNvPr id="330" name="Google Shape;330;gcb913f6704_0_390:notes"/>
           <p:cNvSpPr/>
           <p:nvPr>
             <p:ph idx="2" type="sldImg"/>
@@ -2382,7 +2382,7 @@
       </p:sp>
       <p:sp>
         <p:nvSpPr>
-          <p:cNvPr id="329" name="Google Shape;329;gcb913f6704_0_390:notes"/>
+          <p:cNvPr id="331" name="Google Shape;331;gcb913f6704_0_390:notes"/>
           <p:cNvSpPr txBox="1"/>
           <p:nvPr>
             <p:ph idx="1" type="body"/>
@@ -2432,7 +2432,7 @@
   <p:cSld>
     <p:spTree>
       <p:nvGrpSpPr>
-        <p:cNvPr id="338" name="Shape 338"/>
+        <p:cNvPr id="340" name="Shape 340"/>
         <p:cNvGrpSpPr/>
         <p:nvPr/>
       </p:nvGrpSpPr>
@@ -2446,7 +2446,7 @@
       </p:grpSpPr>
       <p:sp>
         <p:nvSpPr>
-          <p:cNvPr id="339" name="Google Shape;339;gcb913f6704_0_402:notes"/>
+          <p:cNvPr id="341" name="Google Shape;341;gcb913f6704_0_402:notes"/>
           <p:cNvSpPr/>
           <p:nvPr>
             <p:ph idx="2" type="sldImg"/>
@@ -2481,7 +2481,7 @@
       </p:sp>
       <p:sp>
         <p:nvSpPr>
-          <p:cNvPr id="340" name="Google Shape;340;gcb913f6704_0_402:notes"/>
+          <p:cNvPr id="342" name="Google Shape;342;gcb913f6704_0_402:notes"/>
           <p:cNvSpPr txBox="1"/>
           <p:nvPr>
             <p:ph idx="1" type="body"/>
@@ -2531,7 +2531,7 @@
   <p:cSld>
     <p:spTree>
       <p:nvGrpSpPr>
-        <p:cNvPr id="344" name="Shape 344"/>
+        <p:cNvPr id="346" name="Shape 346"/>
         <p:cNvGrpSpPr/>
         <p:nvPr/>
       </p:nvGrpSpPr>
@@ -2545,7 +2545,7 @@
       </p:grpSpPr>
       <p:sp>
         <p:nvSpPr>
-          <p:cNvPr id="345" name="Google Shape;345;gcb913f6704_0_410:notes"/>
+          <p:cNvPr id="347" name="Google Shape;347;gcb913f6704_0_410:notes"/>
           <p:cNvSpPr/>
           <p:nvPr>
             <p:ph idx="2" type="sldImg"/>
@@ -2580,7 +2580,7 @@
       </p:sp>
       <p:sp>
         <p:nvSpPr>
-          <p:cNvPr id="346" name="Google Shape;346;gcb913f6704_0_410:notes"/>
+          <p:cNvPr id="348" name="Google Shape;348;gcb913f6704_0_410:notes"/>
           <p:cNvSpPr txBox="1"/>
           <p:nvPr>
             <p:ph idx="1" type="body"/>
@@ -2630,7 +2630,7 @@
   <p:cSld>
     <p:spTree>
       <p:nvGrpSpPr>
-        <p:cNvPr id="352" name="Shape 352"/>
+        <p:cNvPr id="354" name="Shape 354"/>
         <p:cNvGrpSpPr/>
         <p:nvPr/>
       </p:nvGrpSpPr>
@@ -2644,7 +2644,7 @@
       </p:grpSpPr>
       <p:sp>
         <p:nvSpPr>
-          <p:cNvPr id="353" name="Google Shape;353;gcb913f6704_0_419:notes"/>
+          <p:cNvPr id="355" name="Google Shape;355;gcb913f6704_0_419:notes"/>
           <p:cNvSpPr/>
           <p:nvPr>
             <p:ph idx="2" type="sldImg"/>
@@ -2679,7 +2679,7 @@
       </p:sp>
       <p:sp>
         <p:nvSpPr>
-          <p:cNvPr id="354" name="Google Shape;354;gcb913f6704_0_419:notes"/>
+          <p:cNvPr id="356" name="Google Shape;356;gcb913f6704_0_419:notes"/>
           <p:cNvSpPr txBox="1"/>
           <p:nvPr>
             <p:ph idx="1" type="body"/>
@@ -2729,7 +2729,7 @@
   <p:cSld>
     <p:spTree>
       <p:nvGrpSpPr>
-        <p:cNvPr id="358" name="Shape 358"/>
+        <p:cNvPr id="360" name="Shape 360"/>
         <p:cNvGrpSpPr/>
         <p:nvPr/>
       </p:nvGrpSpPr>
@@ -2743,7 +2743,7 @@
       </p:grpSpPr>
       <p:sp>
         <p:nvSpPr>
-          <p:cNvPr id="359" name="Google Shape;359;gcb913f6704_0_426:notes"/>
+          <p:cNvPr id="361" name="Google Shape;361;gcb913f6704_0_426:notes"/>
           <p:cNvSpPr/>
           <p:nvPr>
             <p:ph idx="2" type="sldImg"/>
@@ -2778,7 +2778,7 @@
       </p:sp>
       <p:sp>
         <p:nvSpPr>
-          <p:cNvPr id="360" name="Google Shape;360;gcb913f6704_0_426:notes"/>
+          <p:cNvPr id="362" name="Google Shape;362;gcb913f6704_0_426:notes"/>
           <p:cNvSpPr txBox="1"/>
           <p:nvPr>
             <p:ph idx="1" type="body"/>
@@ -2828,7 +2828,7 @@
   <p:cSld>
     <p:spTree>
       <p:nvGrpSpPr>
-        <p:cNvPr id="371" name="Shape 371"/>
+        <p:cNvPr id="375" name="Shape 375"/>
         <p:cNvGrpSpPr/>
         <p:nvPr/>
       </p:nvGrpSpPr>
@@ -2842,7 +2842,7 @@
       </p:grpSpPr>
       <p:sp>
         <p:nvSpPr>
-          <p:cNvPr id="372" name="Google Shape;372;gcb913f6704_0_434:notes"/>
+          <p:cNvPr id="376" name="Google Shape;376;gcb913f6704_0_434:notes"/>
           <p:cNvSpPr/>
           <p:nvPr>
             <p:ph idx="2" type="sldImg"/>
@@ -2877,7 +2877,7 @@
       </p:sp>
       <p:sp>
         <p:nvSpPr>
-          <p:cNvPr id="373" name="Google Shape;373;gcb913f6704_0_434:notes"/>
+          <p:cNvPr id="377" name="Google Shape;377;gcb913f6704_0_434:notes"/>
           <p:cNvSpPr txBox="1"/>
           <p:nvPr>
             <p:ph idx="1" type="body"/>
@@ -3084,7 +3084,7 @@
   <p:cSld>
     <p:spTree>
       <p:nvGrpSpPr>
-        <p:cNvPr id="384" name="Shape 384"/>
+        <p:cNvPr id="390" name="Shape 390"/>
         <p:cNvGrpSpPr/>
         <p:nvPr/>
       </p:nvGrpSpPr>
@@ -3098,7 +3098,7 @@
       </p:grpSpPr>
       <p:sp>
         <p:nvSpPr>
-          <p:cNvPr id="385" name="Google Shape;385;gcad54b6b8a_0_18:notes"/>
+          <p:cNvPr id="391" name="Google Shape;391;gcad54b6b8a_0_18:notes"/>
           <p:cNvSpPr/>
           <p:nvPr>
             <p:ph idx="2" type="sldImg"/>
@@ -3133,7 +3133,7 @@
       </p:sp>
       <p:sp>
         <p:nvSpPr>
-          <p:cNvPr id="386" name="Google Shape;386;gcad54b6b8a_0_18:notes"/>
+          <p:cNvPr id="392" name="Google Shape;392;gcad54b6b8a_0_18:notes"/>
           <p:cNvSpPr txBox="1"/>
           <p:nvPr>
             <p:ph idx="1" type="body"/>
@@ -3183,7 +3183,7 @@
   <p:cSld>
     <p:spTree>
       <p:nvGrpSpPr>
-        <p:cNvPr id="395" name="Shape 395"/>
+        <p:cNvPr id="401" name="Shape 401"/>
         <p:cNvGrpSpPr/>
         <p:nvPr/>
       </p:nvGrpSpPr>
@@ -3197,7 +3197,7 @@
       </p:grpSpPr>
       <p:sp>
         <p:nvSpPr>
-          <p:cNvPr id="396" name="Google Shape;396;gcad54b6b8a_0_30:notes"/>
+          <p:cNvPr id="402" name="Google Shape;402;gcad54b6b8a_0_30:notes"/>
           <p:cNvSpPr/>
           <p:nvPr>
             <p:ph idx="2" type="sldImg"/>
@@ -3232,7 +3232,7 @@
       </p:sp>
       <p:sp>
         <p:nvSpPr>
-          <p:cNvPr id="397" name="Google Shape;397;gcad54b6b8a_0_30:notes"/>
+          <p:cNvPr id="403" name="Google Shape;403;gcad54b6b8a_0_30:notes"/>
           <p:cNvSpPr txBox="1"/>
           <p:nvPr>
             <p:ph idx="1" type="body"/>
@@ -3282,7 +3282,7 @@
   <p:cSld>
     <p:spTree>
       <p:nvGrpSpPr>
-        <p:cNvPr id="403" name="Shape 403"/>
+        <p:cNvPr id="409" name="Shape 409"/>
         <p:cNvGrpSpPr/>
         <p:nvPr/>
       </p:nvGrpSpPr>
@@ -3296,7 +3296,7 @@
       </p:grpSpPr>
       <p:sp>
         <p:nvSpPr>
-          <p:cNvPr id="404" name="Google Shape;404;gcad54b6b8a_0_39:notes"/>
+          <p:cNvPr id="410" name="Google Shape;410;gcad54b6b8a_0_39:notes"/>
           <p:cNvSpPr/>
           <p:nvPr>
             <p:ph idx="2" type="sldImg"/>
@@ -3331,7 +3331,7 @@
       </p:sp>
       <p:sp>
         <p:nvSpPr>
-          <p:cNvPr id="405" name="Google Shape;405;gcad54b6b8a_0_39:notes"/>
+          <p:cNvPr id="411" name="Google Shape;411;gcad54b6b8a_0_39:notes"/>
           <p:cNvSpPr txBox="1"/>
           <p:nvPr>
             <p:ph idx="1" type="body"/>
@@ -3381,7 +3381,7 @@
   <p:cSld>
     <p:spTree>
       <p:nvGrpSpPr>
-        <p:cNvPr id="416" name="Shape 416"/>
+        <p:cNvPr id="424" name="Shape 424"/>
         <p:cNvGrpSpPr/>
         <p:nvPr/>
       </p:nvGrpSpPr>
@@ -3395,7 +3395,7 @@
       </p:grpSpPr>
       <p:sp>
         <p:nvSpPr>
-          <p:cNvPr id="417" name="Google Shape;417;gcad54b6b8a_0_48:notes"/>
+          <p:cNvPr id="425" name="Google Shape;425;gcad54b6b8a_0_48:notes"/>
           <p:cNvSpPr/>
           <p:nvPr>
             <p:ph idx="2" type="sldImg"/>
@@ -3430,7 +3430,7 @@
       </p:sp>
       <p:sp>
         <p:nvSpPr>
-          <p:cNvPr id="418" name="Google Shape;418;gcad54b6b8a_0_48:notes"/>
+          <p:cNvPr id="426" name="Google Shape;426;gcad54b6b8a_0_48:notes"/>
           <p:cNvSpPr txBox="1"/>
           <p:nvPr>
             <p:ph idx="1" type="body"/>
@@ -3480,7 +3480,7 @@
   <p:cSld>
     <p:spTree>
       <p:nvGrpSpPr>
-        <p:cNvPr id="429" name="Shape 429"/>
+        <p:cNvPr id="439" name="Shape 439"/>
         <p:cNvGrpSpPr/>
         <p:nvPr/>
       </p:nvGrpSpPr>
@@ -3494,7 +3494,7 @@
       </p:grpSpPr>
       <p:sp>
         <p:nvSpPr>
-          <p:cNvPr id="430" name="Google Shape;430;gcad54b6b8a_0_56:notes"/>
+          <p:cNvPr id="440" name="Google Shape;440;gcad54b6b8a_0_56:notes"/>
           <p:cNvSpPr/>
           <p:nvPr>
             <p:ph idx="2" type="sldImg"/>
@@ -3529,7 +3529,7 @@
       </p:sp>
       <p:sp>
         <p:nvSpPr>
-          <p:cNvPr id="431" name="Google Shape;431;gcad54b6b8a_0_56:notes"/>
+          <p:cNvPr id="441" name="Google Shape;441;gcad54b6b8a_0_56:notes"/>
           <p:cNvSpPr txBox="1"/>
           <p:nvPr>
             <p:ph idx="1" type="body"/>
@@ -3579,7 +3579,7 @@
   <p:cSld>
     <p:spTree>
       <p:nvGrpSpPr>
-        <p:cNvPr id="440" name="Shape 440"/>
+        <p:cNvPr id="450" name="Shape 450"/>
         <p:cNvGrpSpPr/>
         <p:nvPr/>
       </p:nvGrpSpPr>
@@ -3593,7 +3593,7 @@
       </p:grpSpPr>
       <p:sp>
         <p:nvSpPr>
-          <p:cNvPr id="441" name="Google Shape;441;gcad54b6b8a_0_69:notes"/>
+          <p:cNvPr id="451" name="Google Shape;451;gcad54b6b8a_0_69:notes"/>
           <p:cNvSpPr/>
           <p:nvPr>
             <p:ph idx="2" type="sldImg"/>
@@ -3628,7 +3628,7 @@
       </p:sp>
       <p:sp>
         <p:nvSpPr>
-          <p:cNvPr id="442" name="Google Shape;442;gcad54b6b8a_0_69:notes"/>
+          <p:cNvPr id="452" name="Google Shape;452;gcad54b6b8a_0_69:notes"/>
           <p:cNvSpPr txBox="1"/>
           <p:nvPr>
             <p:ph idx="1" type="body"/>
@@ -3678,7 +3678,7 @@
   <p:cSld>
     <p:spTree>
       <p:nvGrpSpPr>
-        <p:cNvPr id="446" name="Shape 446"/>
+        <p:cNvPr id="456" name="Shape 456"/>
         <p:cNvGrpSpPr/>
         <p:nvPr/>
       </p:nvGrpSpPr>
@@ -3692,7 +3692,7 @@
       </p:grpSpPr>
       <p:sp>
         <p:nvSpPr>
-          <p:cNvPr id="447" name="Google Shape;447;gcad54b6b8a_0_76:notes"/>
+          <p:cNvPr id="457" name="Google Shape;457;gcad54b6b8a_0_76:notes"/>
           <p:cNvSpPr/>
           <p:nvPr>
             <p:ph idx="2" type="sldImg"/>
@@ -3727,7 +3727,7 @@
       </p:sp>
       <p:sp>
         <p:nvSpPr>
-          <p:cNvPr id="448" name="Google Shape;448;gcad54b6b8a_0_76:notes"/>
+          <p:cNvPr id="458" name="Google Shape;458;gcad54b6b8a_0_76:notes"/>
           <p:cNvSpPr txBox="1"/>
           <p:nvPr>
             <p:ph idx="1" type="body"/>
@@ -3777,7 +3777,7 @@
   <p:cSld>
     <p:spTree>
       <p:nvGrpSpPr>
-        <p:cNvPr id="459" name="Shape 459"/>
+        <p:cNvPr id="469" name="Shape 469"/>
         <p:cNvGrpSpPr/>
         <p:nvPr/>
       </p:nvGrpSpPr>
@@ -3791,7 +3791,7 @@
       </p:grpSpPr>
       <p:sp>
         <p:nvSpPr>
-          <p:cNvPr id="460" name="Google Shape;460;gcad54b6b8a_0_90:notes"/>
+          <p:cNvPr id="470" name="Google Shape;470;gcad54b6b8a_0_90:notes"/>
           <p:cNvSpPr/>
           <p:nvPr>
             <p:ph idx="2" type="sldImg"/>
@@ -3826,7 +3826,7 @@
       </p:sp>
       <p:sp>
         <p:nvSpPr>
-          <p:cNvPr id="461" name="Google Shape;461;gcad54b6b8a_0_90:notes"/>
+          <p:cNvPr id="471" name="Google Shape;471;gcad54b6b8a_0_90:notes"/>
           <p:cNvSpPr txBox="1"/>
           <p:nvPr>
             <p:ph idx="1" type="body"/>
@@ -3876,7 +3876,7 @@
   <p:cSld>
     <p:spTree>
       <p:nvGrpSpPr>
-        <p:cNvPr id="476" name="Shape 476"/>
+        <p:cNvPr id="488" name="Shape 488"/>
         <p:cNvGrpSpPr/>
         <p:nvPr/>
       </p:nvGrpSpPr>
@@ -3890,7 +3890,7 @@
       </p:grpSpPr>
       <p:sp>
         <p:nvSpPr>
-          <p:cNvPr id="477" name="Google Shape;477;gcad54b6b8a_0_106:notes"/>
+          <p:cNvPr id="489" name="Google Shape;489;gcad54b6b8a_0_106:notes"/>
           <p:cNvSpPr/>
           <p:nvPr>
             <p:ph idx="2" type="sldImg"/>
@@ -3925,7 +3925,7 @@
       </p:sp>
       <p:sp>
         <p:nvSpPr>
-          <p:cNvPr id="478" name="Google Shape;478;gcad54b6b8a_0_106:notes"/>
+          <p:cNvPr id="490" name="Google Shape;490;gcad54b6b8a_0_106:notes"/>
           <p:cNvSpPr txBox="1"/>
           <p:nvPr>
             <p:ph idx="1" type="body"/>
@@ -3975,7 +3975,7 @@
   <p:cSld>
     <p:spTree>
       <p:nvGrpSpPr>
-        <p:cNvPr id="493" name="Shape 493"/>
+        <p:cNvPr id="507" name="Shape 507"/>
         <p:cNvGrpSpPr/>
         <p:nvPr/>
       </p:nvGrpSpPr>
@@ -3989,7 +3989,7 @@
       </p:grpSpPr>
       <p:sp>
         <p:nvSpPr>
-          <p:cNvPr id="494" name="Google Shape;494;gcad54b6b8a_0_114:notes"/>
+          <p:cNvPr id="508" name="Google Shape;508;gcad54b6b8a_0_114:notes"/>
           <p:cNvSpPr/>
           <p:nvPr>
             <p:ph idx="2" type="sldImg"/>
@@ -4024,7 +4024,7 @@
       </p:sp>
       <p:sp>
         <p:nvSpPr>
-          <p:cNvPr id="495" name="Google Shape;495;gcad54b6b8a_0_114:notes"/>
+          <p:cNvPr id="509" name="Google Shape;509;gcad54b6b8a_0_114:notes"/>
           <p:cNvSpPr txBox="1"/>
           <p:nvPr>
             <p:ph idx="1" type="body"/>
@@ -4173,7 +4173,7 @@
   <p:cSld>
     <p:spTree>
       <p:nvGrpSpPr>
-        <p:cNvPr id="504" name="Shape 504"/>
+        <p:cNvPr id="518" name="Shape 518"/>
         <p:cNvGrpSpPr/>
         <p:nvPr/>
       </p:nvGrpSpPr>
@@ -4187,7 +4187,7 @@
       </p:grpSpPr>
       <p:sp>
         <p:nvSpPr>
-          <p:cNvPr id="505" name="Google Shape;505;gcad54b6b8a_0_126:notes"/>
+          <p:cNvPr id="519" name="Google Shape;519;gcad54b6b8a_0_126:notes"/>
           <p:cNvSpPr/>
           <p:nvPr>
             <p:ph idx="2" type="sldImg"/>
@@ -4222,7 +4222,7 @@
       </p:sp>
       <p:sp>
         <p:nvSpPr>
-          <p:cNvPr id="506" name="Google Shape;506;gcad54b6b8a_0_126:notes"/>
+          <p:cNvPr id="520" name="Google Shape;520;gcad54b6b8a_0_126:notes"/>
           <p:cNvSpPr txBox="1"/>
           <p:nvPr>
             <p:ph idx="1" type="body"/>
@@ -4272,7 +4272,7 @@
   <p:cSld>
     <p:spTree>
       <p:nvGrpSpPr>
-        <p:cNvPr id="512" name="Shape 512"/>
+        <p:cNvPr id="526" name="Shape 526"/>
         <p:cNvGrpSpPr/>
         <p:nvPr/>
       </p:nvGrpSpPr>
@@ -4286,7 +4286,7 @@
       </p:grpSpPr>
       <p:sp>
         <p:nvSpPr>
-          <p:cNvPr id="513" name="Google Shape;513;gcad54b6b8a_0_135:notes"/>
+          <p:cNvPr id="527" name="Google Shape;527;gcad54b6b8a_0_135:notes"/>
           <p:cNvSpPr/>
           <p:nvPr>
             <p:ph idx="2" type="sldImg"/>
@@ -4321,7 +4321,7 @@
       </p:sp>
       <p:sp>
         <p:nvSpPr>
-          <p:cNvPr id="514" name="Google Shape;514;gcad54b6b8a_0_135:notes"/>
+          <p:cNvPr id="528" name="Google Shape;528;gcad54b6b8a_0_135:notes"/>
           <p:cNvSpPr txBox="1"/>
           <p:nvPr>
             <p:ph idx="1" type="body"/>
@@ -4371,7 +4371,7 @@
   <p:cSld>
     <p:spTree>
       <p:nvGrpSpPr>
-        <p:cNvPr id="520" name="Shape 520"/>
+        <p:cNvPr id="534" name="Shape 534"/>
         <p:cNvGrpSpPr/>
         <p:nvPr/>
       </p:nvGrpSpPr>
@@ -4385,7 +4385,7 @@
       </p:grpSpPr>
       <p:sp>
         <p:nvSpPr>
-          <p:cNvPr id="521" name="Google Shape;521;gcad54b6b8a_0_144:notes"/>
+          <p:cNvPr id="535" name="Google Shape;535;gcad54b6b8a_0_144:notes"/>
           <p:cNvSpPr/>
           <p:nvPr>
             <p:ph idx="2" type="sldImg"/>
@@ -4420,7 +4420,7 @@
       </p:sp>
       <p:sp>
         <p:nvSpPr>
-          <p:cNvPr id="522" name="Google Shape;522;gcad54b6b8a_0_144:notes"/>
+          <p:cNvPr id="536" name="Google Shape;536;gcad54b6b8a_0_144:notes"/>
           <p:cNvSpPr txBox="1"/>
           <p:nvPr>
             <p:ph idx="1" type="body"/>
@@ -4470,7 +4470,7 @@
   <p:cSld>
     <p:spTree>
       <p:nvGrpSpPr>
-        <p:cNvPr id="535" name="Shape 535"/>
+        <p:cNvPr id="551" name="Shape 551"/>
         <p:cNvGrpSpPr/>
         <p:nvPr/>
       </p:nvGrpSpPr>
@@ -4484,7 +4484,7 @@
       </p:grpSpPr>
       <p:sp>
         <p:nvSpPr>
-          <p:cNvPr id="536" name="Google Shape;536;gcad54b6b8a_0_152:notes"/>
+          <p:cNvPr id="552" name="Google Shape;552;gcad54b6b8a_0_152:notes"/>
           <p:cNvSpPr/>
           <p:nvPr>
             <p:ph idx="2" type="sldImg"/>
@@ -4519,7 +4519,7 @@
       </p:sp>
       <p:sp>
         <p:nvSpPr>
-          <p:cNvPr id="537" name="Google Shape;537;gcad54b6b8a_0_152:notes"/>
+          <p:cNvPr id="553" name="Google Shape;553;gcad54b6b8a_0_152:notes"/>
           <p:cNvSpPr txBox="1"/>
           <p:nvPr>
             <p:ph idx="1" type="body"/>
@@ -4569,7 +4569,7 @@
   <p:cSld>
     <p:spTree>
       <p:nvGrpSpPr>
-        <p:cNvPr id="550" name="Shape 550"/>
+        <p:cNvPr id="567" name="Shape 567"/>
         <p:cNvGrpSpPr/>
         <p:nvPr/>
       </p:nvGrpSpPr>
@@ -4583,7 +4583,7 @@
       </p:grpSpPr>
       <p:sp>
         <p:nvSpPr>
-          <p:cNvPr id="551" name="Google Shape;551;gcad54b6b8a_0_0:notes"/>
+          <p:cNvPr id="568" name="Google Shape;568;gcad54b6b8a_0_0:notes"/>
           <p:cNvSpPr/>
           <p:nvPr>
             <p:ph idx="2" type="sldImg"/>
@@ -4618,7 +4618,7 @@
       </p:sp>
       <p:sp>
         <p:nvSpPr>
-          <p:cNvPr id="552" name="Google Shape;552;gcad54b6b8a_0_0:notes"/>
+          <p:cNvPr id="569" name="Google Shape;569;gcad54b6b8a_0_0:notes"/>
           <p:cNvSpPr txBox="1"/>
           <p:nvPr>
             <p:ph idx="1" type="body"/>
@@ -4668,7 +4668,7 @@
   <p:cSld>
     <p:spTree>
       <p:nvGrpSpPr>
-        <p:cNvPr id="562" name="Shape 562"/>
+        <p:cNvPr id="579" name="Shape 579"/>
         <p:cNvGrpSpPr/>
         <p:nvPr/>
       </p:nvGrpSpPr>
@@ -4682,7 +4682,7 @@
       </p:grpSpPr>
       <p:sp>
         <p:nvSpPr>
-          <p:cNvPr id="563" name="Google Shape;563;gcad54b6b8a_0_161:notes"/>
+          <p:cNvPr id="580" name="Google Shape;580;gcad54b6b8a_0_161:notes"/>
           <p:cNvSpPr/>
           <p:nvPr>
             <p:ph idx="2" type="sldImg"/>
@@ -4717,7 +4717,7 @@
       </p:sp>
       <p:sp>
         <p:nvSpPr>
-          <p:cNvPr id="564" name="Google Shape;564;gcad54b6b8a_0_161:notes"/>
+          <p:cNvPr id="581" name="Google Shape;581;gcad54b6b8a_0_161:notes"/>
           <p:cNvSpPr txBox="1"/>
           <p:nvPr>
             <p:ph idx="1" type="body"/>
@@ -4767,7 +4767,7 @@
   <p:cSld>
     <p:spTree>
       <p:nvGrpSpPr>
-        <p:cNvPr id="571" name="Shape 571"/>
+        <p:cNvPr id="588" name="Shape 588"/>
         <p:cNvGrpSpPr/>
         <p:nvPr/>
       </p:nvGrpSpPr>
@@ -4781,7 +4781,7 @@
       </p:grpSpPr>
       <p:sp>
         <p:nvSpPr>
-          <p:cNvPr id="572" name="Google Shape;572;gcad54b6b8a_0_171:notes"/>
+          <p:cNvPr id="589" name="Google Shape;589;gcad54b6b8a_0_171:notes"/>
           <p:cNvSpPr/>
           <p:nvPr>
             <p:ph idx="2" type="sldImg"/>
@@ -4816,7 +4816,7 @@
       </p:sp>
       <p:sp>
         <p:nvSpPr>
-          <p:cNvPr id="573" name="Google Shape;573;gcad54b6b8a_0_171:notes"/>
+          <p:cNvPr id="590" name="Google Shape;590;gcad54b6b8a_0_171:notes"/>
           <p:cNvSpPr txBox="1"/>
           <p:nvPr>
             <p:ph idx="1" type="body"/>
@@ -4866,7 +4866,7 @@
   <p:cSld>
     <p:spTree>
       <p:nvGrpSpPr>
-        <p:cNvPr id="583" name="Shape 583"/>
+        <p:cNvPr id="600" name="Shape 600"/>
         <p:cNvGrpSpPr/>
         <p:nvPr/>
       </p:nvGrpSpPr>
@@ -4880,7 +4880,7 @@
       </p:grpSpPr>
       <p:sp>
         <p:nvSpPr>
-          <p:cNvPr id="584" name="Google Shape;584;gcad54b6b8a_0_12:notes"/>
+          <p:cNvPr id="601" name="Google Shape;601;gcad54b6b8a_0_12:notes"/>
           <p:cNvSpPr/>
           <p:nvPr>
             <p:ph idx="2" type="sldImg"/>
@@ -4915,7 +4915,7 @@
       </p:sp>
       <p:sp>
         <p:nvSpPr>
-          <p:cNvPr id="585" name="Google Shape;585;gcad54b6b8a_0_12:notes"/>
+          <p:cNvPr id="602" name="Google Shape;602;gcad54b6b8a_0_12:notes"/>
           <p:cNvSpPr txBox="1"/>
           <p:nvPr>
             <p:ph idx="1" type="body"/>
@@ -4965,7 +4965,7 @@
   <p:cSld>
     <p:spTree>
       <p:nvGrpSpPr>
-        <p:cNvPr id="591" name="Shape 591"/>
+        <p:cNvPr id="608" name="Shape 608"/>
         <p:cNvGrpSpPr/>
         <p:nvPr/>
       </p:nvGrpSpPr>
@@ -4979,7 +4979,7 @@
       </p:grpSpPr>
       <p:sp>
         <p:nvSpPr>
-          <p:cNvPr id="592" name="Google Shape;592;gcad54b6b8a_0_188:notes"/>
+          <p:cNvPr id="609" name="Google Shape;609;gcad54b6b8a_0_188:notes"/>
           <p:cNvSpPr/>
           <p:nvPr>
             <p:ph idx="2" type="sldImg"/>
@@ -5014,7 +5014,7 @@
       </p:sp>
       <p:sp>
         <p:nvSpPr>
-          <p:cNvPr id="593" name="Google Shape;593;gcad54b6b8a_0_188:notes"/>
+          <p:cNvPr id="610" name="Google Shape;610;gcad54b6b8a_0_188:notes"/>
           <p:cNvSpPr txBox="1"/>
           <p:nvPr>
             <p:ph idx="1" type="body"/>
@@ -5064,7 +5064,7 @@
   <p:cSld>
     <p:spTree>
       <p:nvGrpSpPr>
-        <p:cNvPr id="604" name="Shape 604"/>
+        <p:cNvPr id="622" name="Shape 622"/>
         <p:cNvGrpSpPr/>
         <p:nvPr/>
       </p:nvGrpSpPr>
@@ -5078,7 +5078,7 @@
       </p:grpSpPr>
       <p:sp>
         <p:nvSpPr>
-          <p:cNvPr id="605" name="Google Shape;605;gcad54b6b8a_0_204:notes"/>
+          <p:cNvPr id="623" name="Google Shape;623;gcad54b6b8a_0_204:notes"/>
           <p:cNvSpPr/>
           <p:nvPr>
             <p:ph idx="2" type="sldImg"/>
@@ -5113,7 +5113,7 @@
       </p:sp>
       <p:sp>
         <p:nvSpPr>
-          <p:cNvPr id="606" name="Google Shape;606;gcad54b6b8a_0_204:notes"/>
+          <p:cNvPr id="624" name="Google Shape;624;gcad54b6b8a_0_204:notes"/>
           <p:cNvSpPr txBox="1"/>
           <p:nvPr>
             <p:ph idx="1" type="body"/>
@@ -5262,7 +5262,7 @@
   <p:cSld>
     <p:spTree>
       <p:nvGrpSpPr>
-        <p:cNvPr id="617" name="Shape 617"/>
+        <p:cNvPr id="636" name="Shape 636"/>
         <p:cNvGrpSpPr/>
         <p:nvPr/>
       </p:nvGrpSpPr>
@@ -5276,7 +5276,7 @@
       </p:grpSpPr>
       <p:sp>
         <p:nvSpPr>
-          <p:cNvPr id="618" name="Google Shape;618;gcad54b6b8a_0_223:notes"/>
+          <p:cNvPr id="637" name="Google Shape;637;gcad54b6b8a_0_223:notes"/>
           <p:cNvSpPr/>
           <p:nvPr>
             <p:ph idx="2" type="sldImg"/>
@@ -5311,7 +5311,7 @@
       </p:sp>
       <p:sp>
         <p:nvSpPr>
-          <p:cNvPr id="619" name="Google Shape;619;gcad54b6b8a_0_223:notes"/>
+          <p:cNvPr id="638" name="Google Shape;638;gcad54b6b8a_0_223:notes"/>
           <p:cNvSpPr txBox="1"/>
           <p:nvPr>
             <p:ph idx="1" type="body"/>
@@ -15972,6 +15972,34 @@
           </a:p>
         </p:txBody>
       </p:sp>
+      <p:pic>
+        <p:nvPicPr>
+          <p:cNvPr id="294" name="Google Shape;294;p33"/>
+          <p:cNvPicPr preferRelativeResize="0"/>
+          <p:nvPr/>
+        </p:nvPicPr>
+        <p:blipFill>
+          <a:blip r:embed="rId5">
+            <a:alphaModFix/>
+          </a:blip>
+          <a:stretch>
+            <a:fillRect/>
+          </a:stretch>
+        </p:blipFill>
+        <p:spPr>
+          <a:xfrm>
+            <a:off x="5544172" y="2464897"/>
+            <a:ext cx="3288135" cy="1316662"/>
+          </a:xfrm>
+          <a:prstGeom prst="rect">
+            <a:avLst/>
+          </a:prstGeom>
+          <a:noFill/>
+          <a:ln>
+            <a:noFill/>
+          </a:ln>
+        </p:spPr>
+      </p:pic>
     </p:spTree>
   </p:cSld>
   <p:clrMapOvr>
@@ -15985,7 +16013,7 @@
   <p:cSld>
     <p:spTree>
       <p:nvGrpSpPr>
-        <p:cNvPr id="297" name="Shape 297"/>
+        <p:cNvPr id="298" name="Shape 298"/>
         <p:cNvGrpSpPr/>
         <p:nvPr/>
       </p:nvGrpSpPr>
@@ -15999,7 +16027,7 @@
       </p:grpSpPr>
       <p:sp>
         <p:nvSpPr>
-          <p:cNvPr id="298" name="Google Shape;298;p34"/>
+          <p:cNvPr id="299" name="Google Shape;299;p34"/>
           <p:cNvSpPr txBox="1"/>
           <p:nvPr>
             <p:ph type="title"/>
@@ -16040,7 +16068,7 @@
       </p:sp>
       <p:sp>
         <p:nvSpPr>
-          <p:cNvPr id="299" name="Google Shape;299;p34"/>
+          <p:cNvPr id="300" name="Google Shape;300;p34"/>
           <p:cNvSpPr txBox="1"/>
           <p:nvPr/>
         </p:nvSpPr>
@@ -16087,7 +16115,7 @@
       </p:sp>
       <p:sp>
         <p:nvSpPr>
-          <p:cNvPr id="300" name="Google Shape;300;p34"/>
+          <p:cNvPr id="301" name="Google Shape;301;p34"/>
           <p:cNvSpPr txBox="1"/>
           <p:nvPr>
             <p:ph idx="1" type="body"/>
@@ -16130,7 +16158,7 @@
       </p:sp>
       <p:sp>
         <p:nvSpPr>
-          <p:cNvPr id="301" name="Google Shape;301;p34"/>
+          <p:cNvPr id="302" name="Google Shape;302;p34"/>
           <p:cNvSpPr txBox="1"/>
           <p:nvPr>
             <p:ph idx="1" type="body"/>
@@ -16176,7 +16204,7 @@
       </p:sp>
       <p:sp>
         <p:nvSpPr>
-          <p:cNvPr id="302" name="Google Shape;302;p34"/>
+          <p:cNvPr id="303" name="Google Shape;303;p34"/>
           <p:cNvSpPr txBox="1"/>
           <p:nvPr>
             <p:ph idx="1" type="body"/>
@@ -16219,7 +16247,7 @@
       </p:sp>
       <p:sp>
         <p:nvSpPr>
-          <p:cNvPr id="303" name="Google Shape;303;p34"/>
+          <p:cNvPr id="304" name="Google Shape;304;p34"/>
           <p:cNvSpPr txBox="1"/>
           <p:nvPr/>
         </p:nvSpPr>
@@ -16272,7 +16300,7 @@
       </p:sp>
       <p:sp>
         <p:nvSpPr>
-          <p:cNvPr id="304" name="Google Shape;304;p34"/>
+          <p:cNvPr id="305" name="Google Shape;305;p34"/>
           <p:cNvSpPr/>
           <p:nvPr/>
         </p:nvSpPr>
@@ -16325,7 +16353,7 @@
       </p:sp>
       <p:sp>
         <p:nvSpPr>
-          <p:cNvPr id="305" name="Google Shape;305;p34"/>
+          <p:cNvPr id="306" name="Google Shape;306;p34"/>
           <p:cNvSpPr/>
           <p:nvPr/>
         </p:nvSpPr>
@@ -16378,7 +16406,7 @@
       </p:sp>
       <p:sp>
         <p:nvSpPr>
-          <p:cNvPr id="306" name="Google Shape;306;p34"/>
+          <p:cNvPr id="307" name="Google Shape;307;p34"/>
           <p:cNvSpPr/>
           <p:nvPr/>
         </p:nvSpPr>
@@ -16431,7 +16459,7 @@
       </p:sp>
       <p:sp>
         <p:nvSpPr>
-          <p:cNvPr id="307" name="Google Shape;307;p34"/>
+          <p:cNvPr id="308" name="Google Shape;308;p34"/>
           <p:cNvSpPr txBox="1"/>
           <p:nvPr/>
         </p:nvSpPr>
@@ -16484,7 +16512,7 @@
       </p:sp>
       <p:sp>
         <p:nvSpPr>
-          <p:cNvPr id="308" name="Google Shape;308;p34"/>
+          <p:cNvPr id="309" name="Google Shape;309;p34"/>
           <p:cNvSpPr txBox="1"/>
           <p:nvPr/>
         </p:nvSpPr>
@@ -16537,7 +16565,7 @@
       </p:sp>
       <p:sp>
         <p:nvSpPr>
-          <p:cNvPr id="309" name="Google Shape;309;p34"/>
+          <p:cNvPr id="310" name="Google Shape;310;p34"/>
           <p:cNvSpPr txBox="1"/>
           <p:nvPr/>
         </p:nvSpPr>
@@ -16590,7 +16618,7 @@
       </p:sp>
       <p:sp>
         <p:nvSpPr>
-          <p:cNvPr id="310" name="Google Shape;310;p34"/>
+          <p:cNvPr id="311" name="Google Shape;311;p34"/>
           <p:cNvSpPr/>
           <p:nvPr/>
         </p:nvSpPr>
@@ -16643,7 +16671,7 @@
       </p:sp>
       <p:sp>
         <p:nvSpPr>
-          <p:cNvPr id="311" name="Google Shape;311;p34"/>
+          <p:cNvPr id="312" name="Google Shape;312;p34"/>
           <p:cNvSpPr/>
           <p:nvPr/>
         </p:nvSpPr>
@@ -16696,7 +16724,7 @@
       </p:sp>
       <p:sp>
         <p:nvSpPr>
-          <p:cNvPr id="312" name="Google Shape;312;p34"/>
+          <p:cNvPr id="313" name="Google Shape;313;p34"/>
           <p:cNvSpPr txBox="1"/>
           <p:nvPr/>
         </p:nvSpPr>
@@ -16747,6 +16775,34 @@
           </a:p>
         </p:txBody>
       </p:sp>
+      <p:pic>
+        <p:nvPicPr>
+          <p:cNvPr id="314" name="Google Shape;314;p34"/>
+          <p:cNvPicPr preferRelativeResize="0"/>
+          <p:nvPr/>
+        </p:nvPicPr>
+        <p:blipFill>
+          <a:blip r:embed="rId5">
+            <a:alphaModFix/>
+          </a:blip>
+          <a:stretch>
+            <a:fillRect/>
+          </a:stretch>
+        </p:blipFill>
+        <p:spPr>
+          <a:xfrm>
+            <a:off x="5383700" y="2432288"/>
+            <a:ext cx="3524250" cy="895350"/>
+          </a:xfrm>
+          <a:prstGeom prst="rect">
+            <a:avLst/>
+          </a:prstGeom>
+          <a:noFill/>
+          <a:ln>
+            <a:noFill/>
+          </a:ln>
+        </p:spPr>
+      </p:pic>
     </p:spTree>
   </p:cSld>
   <p:clrMapOvr>
@@ -16760,7 +16816,7 @@
   <p:cSld>
     <p:spTree>
       <p:nvGrpSpPr>
-        <p:cNvPr id="316" name="Shape 316"/>
+        <p:cNvPr id="318" name="Shape 318"/>
         <p:cNvGrpSpPr/>
         <p:nvPr/>
       </p:nvGrpSpPr>
@@ -16774,7 +16830,7 @@
       </p:grpSpPr>
       <p:sp>
         <p:nvSpPr>
-          <p:cNvPr id="317" name="Google Shape;317;p35"/>
+          <p:cNvPr id="319" name="Google Shape;319;p35"/>
           <p:cNvSpPr txBox="1"/>
           <p:nvPr>
             <p:ph type="title"/>
@@ -16815,7 +16871,7 @@
       </p:sp>
       <p:pic>
         <p:nvPicPr>
-          <p:cNvPr id="318" name="Google Shape;318;p35"/>
+          <p:cNvPr id="320" name="Google Shape;320;p35"/>
           <p:cNvPicPr preferRelativeResize="0"/>
           <p:nvPr/>
         </p:nvPicPr>
@@ -16843,7 +16899,7 @@
       </p:pic>
       <p:pic>
         <p:nvPicPr>
-          <p:cNvPr id="319" name="Google Shape;319;p35"/>
+          <p:cNvPr id="321" name="Google Shape;321;p35"/>
           <p:cNvPicPr preferRelativeResize="0"/>
           <p:nvPr/>
         </p:nvPicPr>
@@ -16871,7 +16927,7 @@
       </p:pic>
       <p:sp>
         <p:nvSpPr>
-          <p:cNvPr id="320" name="Google Shape;320;p35"/>
+          <p:cNvPr id="322" name="Google Shape;322;p35"/>
           <p:cNvSpPr/>
           <p:nvPr/>
         </p:nvSpPr>
@@ -16923,7 +16979,7 @@
       </p:sp>
       <p:sp>
         <p:nvSpPr>
-          <p:cNvPr id="321" name="Google Shape;321;p35"/>
+          <p:cNvPr id="323" name="Google Shape;323;p35"/>
           <p:cNvSpPr txBox="1"/>
           <p:nvPr>
             <p:ph idx="1" type="body"/>
@@ -16966,7 +17022,7 @@
       </p:sp>
       <p:sp>
         <p:nvSpPr>
-          <p:cNvPr id="322" name="Google Shape;322;p35"/>
+          <p:cNvPr id="324" name="Google Shape;324;p35"/>
           <p:cNvSpPr/>
           <p:nvPr/>
         </p:nvSpPr>
@@ -17018,7 +17074,7 @@
       </p:sp>
       <p:pic>
         <p:nvPicPr>
-          <p:cNvPr id="323" name="Google Shape;323;p35"/>
+          <p:cNvPr id="325" name="Google Shape;325;p35"/>
           <p:cNvPicPr preferRelativeResize="0"/>
           <p:nvPr/>
         </p:nvPicPr>
@@ -17046,7 +17102,7 @@
       </p:pic>
       <p:pic>
         <p:nvPicPr>
-          <p:cNvPr id="324" name="Google Shape;324;p35"/>
+          <p:cNvPr id="326" name="Google Shape;326;p35"/>
           <p:cNvPicPr preferRelativeResize="0"/>
           <p:nvPr/>
         </p:nvPicPr>
@@ -17074,7 +17130,7 @@
       </p:pic>
       <p:pic>
         <p:nvPicPr>
-          <p:cNvPr id="325" name="Google Shape;325;p35"/>
+          <p:cNvPr id="327" name="Google Shape;327;p35"/>
           <p:cNvPicPr preferRelativeResize="0"/>
           <p:nvPr/>
         </p:nvPicPr>
@@ -17102,7 +17158,7 @@
       </p:pic>
       <p:pic>
         <p:nvPicPr>
-          <p:cNvPr id="326" name="Google Shape;326;p35"/>
+          <p:cNvPr id="328" name="Google Shape;328;p35"/>
           <p:cNvPicPr preferRelativeResize="0"/>
           <p:nvPr/>
         </p:nvPicPr>
@@ -17141,7 +17197,7 @@
   <p:cSld>
     <p:spTree>
       <p:nvGrpSpPr>
-        <p:cNvPr id="330" name="Shape 330"/>
+        <p:cNvPr id="332" name="Shape 332"/>
         <p:cNvGrpSpPr/>
         <p:nvPr/>
       </p:nvGrpSpPr>
@@ -17155,7 +17211,7 @@
       </p:grpSpPr>
       <p:sp>
         <p:nvSpPr>
-          <p:cNvPr id="331" name="Google Shape;331;p36"/>
+          <p:cNvPr id="333" name="Google Shape;333;p36"/>
           <p:cNvSpPr txBox="1"/>
           <p:nvPr>
             <p:ph type="title"/>
@@ -17195,7 +17251,7 @@
       </p:sp>
       <p:sp>
         <p:nvSpPr>
-          <p:cNvPr id="332" name="Google Shape;332;p36"/>
+          <p:cNvPr id="334" name="Google Shape;334;p36"/>
           <p:cNvSpPr txBox="1"/>
           <p:nvPr/>
         </p:nvSpPr>
@@ -17251,7 +17307,7 @@
       </p:sp>
       <p:sp>
         <p:nvSpPr>
-          <p:cNvPr id="333" name="Google Shape;333;p36"/>
+          <p:cNvPr id="335" name="Google Shape;335;p36"/>
           <p:cNvSpPr txBox="1"/>
           <p:nvPr/>
         </p:nvSpPr>
@@ -17304,7 +17360,7 @@
       </p:sp>
       <p:sp>
         <p:nvSpPr>
-          <p:cNvPr id="334" name="Google Shape;334;p36"/>
+          <p:cNvPr id="336" name="Google Shape;336;p36"/>
           <p:cNvSpPr/>
           <p:nvPr/>
         </p:nvSpPr>
@@ -17357,7 +17413,7 @@
       </p:sp>
       <p:sp>
         <p:nvSpPr>
-          <p:cNvPr id="335" name="Google Shape;335;p36"/>
+          <p:cNvPr id="337" name="Google Shape;337;p36"/>
           <p:cNvSpPr txBox="1"/>
           <p:nvPr>
             <p:ph idx="1" type="body"/>
@@ -17406,7 +17462,7 @@
       </p:sp>
       <p:pic>
         <p:nvPicPr>
-          <p:cNvPr id="336" name="Google Shape;336;p36"/>
+          <p:cNvPr id="338" name="Google Shape;338;p36"/>
           <p:cNvPicPr preferRelativeResize="0"/>
           <p:nvPr/>
         </p:nvPicPr>
@@ -17434,7 +17490,7 @@
       </p:pic>
       <p:pic>
         <p:nvPicPr>
-          <p:cNvPr id="337" name="Google Shape;337;p36"/>
+          <p:cNvPr id="339" name="Google Shape;339;p36"/>
           <p:cNvPicPr preferRelativeResize="0"/>
           <p:nvPr/>
         </p:nvPicPr>
@@ -17473,7 +17529,7 @@
   <p:cSld>
     <p:spTree>
       <p:nvGrpSpPr>
-        <p:cNvPr id="341" name="Shape 341"/>
+        <p:cNvPr id="343" name="Shape 343"/>
         <p:cNvGrpSpPr/>
         <p:nvPr/>
       </p:nvGrpSpPr>
@@ -17487,7 +17543,7 @@
       </p:grpSpPr>
       <p:pic>
         <p:nvPicPr>
-          <p:cNvPr id="342" name="Google Shape;342;p37"/>
+          <p:cNvPr id="344" name="Google Shape;344;p37"/>
           <p:cNvPicPr preferRelativeResize="0"/>
           <p:nvPr/>
         </p:nvPicPr>
@@ -17515,7 +17571,7 @@
       </p:pic>
       <p:pic>
         <p:nvPicPr>
-          <p:cNvPr id="343" name="Google Shape;343;p37"/>
+          <p:cNvPr id="345" name="Google Shape;345;p37"/>
           <p:cNvPicPr preferRelativeResize="0"/>
           <p:nvPr/>
         </p:nvPicPr>
@@ -17554,7 +17610,7 @@
   <p:cSld>
     <p:spTree>
       <p:nvGrpSpPr>
-        <p:cNvPr id="347" name="Shape 347"/>
+        <p:cNvPr id="349" name="Shape 349"/>
         <p:cNvGrpSpPr/>
         <p:nvPr/>
       </p:nvGrpSpPr>
@@ -17568,7 +17624,7 @@
       </p:grpSpPr>
       <p:sp>
         <p:nvSpPr>
-          <p:cNvPr id="348" name="Google Shape;348;p38"/>
+          <p:cNvPr id="350" name="Google Shape;350;p38"/>
           <p:cNvSpPr txBox="1"/>
           <p:nvPr/>
         </p:nvSpPr>
@@ -17621,7 +17677,7 @@
       </p:sp>
       <p:sp>
         <p:nvSpPr>
-          <p:cNvPr id="349" name="Google Shape;349;p38"/>
+          <p:cNvPr id="351" name="Google Shape;351;p38"/>
           <p:cNvSpPr/>
           <p:nvPr/>
         </p:nvSpPr>
@@ -17674,7 +17730,7 @@
       </p:sp>
       <p:pic>
         <p:nvPicPr>
-          <p:cNvPr id="350" name="Google Shape;350;p38"/>
+          <p:cNvPr id="352" name="Google Shape;352;p38"/>
           <p:cNvPicPr preferRelativeResize="0"/>
           <p:nvPr/>
         </p:nvPicPr>
@@ -17702,7 +17758,7 @@
       </p:pic>
       <p:pic>
         <p:nvPicPr>
-          <p:cNvPr id="351" name="Google Shape;351;p38"/>
+          <p:cNvPr id="353" name="Google Shape;353;p38"/>
           <p:cNvPicPr preferRelativeResize="0"/>
           <p:nvPr/>
         </p:nvPicPr>
@@ -17741,7 +17797,7 @@
   <p:cSld>
     <p:spTree>
       <p:nvGrpSpPr>
-        <p:cNvPr id="355" name="Shape 355"/>
+        <p:cNvPr id="357" name="Shape 357"/>
         <p:cNvGrpSpPr/>
         <p:nvPr/>
       </p:nvGrpSpPr>
@@ -17755,7 +17811,7 @@
       </p:grpSpPr>
       <p:pic>
         <p:nvPicPr>
-          <p:cNvPr id="356" name="Google Shape;356;p39"/>
+          <p:cNvPr id="358" name="Google Shape;358;p39"/>
           <p:cNvPicPr preferRelativeResize="0"/>
           <p:nvPr/>
         </p:nvPicPr>
@@ -17783,7 +17839,7 @@
       </p:pic>
       <p:pic>
         <p:nvPicPr>
-          <p:cNvPr id="357" name="Google Shape;357;p39"/>
+          <p:cNvPr id="359" name="Google Shape;359;p39"/>
           <p:cNvPicPr preferRelativeResize="0"/>
           <p:nvPr/>
         </p:nvPicPr>
@@ -17822,7 +17878,7 @@
   <p:cSld>
     <p:spTree>
       <p:nvGrpSpPr>
-        <p:cNvPr id="361" name="Shape 361"/>
+        <p:cNvPr id="363" name="Shape 363"/>
         <p:cNvGrpSpPr/>
         <p:nvPr/>
       </p:nvGrpSpPr>
@@ -17836,7 +17892,7 @@
       </p:grpSpPr>
       <p:sp>
         <p:nvSpPr>
-          <p:cNvPr id="362" name="Google Shape;362;p40"/>
+          <p:cNvPr id="364" name="Google Shape;364;p40"/>
           <p:cNvSpPr txBox="1"/>
           <p:nvPr>
             <p:ph type="title"/>
@@ -17877,7 +17933,7 @@
       </p:sp>
       <p:sp>
         <p:nvSpPr>
-          <p:cNvPr id="363" name="Google Shape;363;p40"/>
+          <p:cNvPr id="365" name="Google Shape;365;p40"/>
           <p:cNvSpPr txBox="1"/>
           <p:nvPr/>
         </p:nvSpPr>
@@ -17933,7 +17989,7 @@
       </p:sp>
       <p:sp>
         <p:nvSpPr>
-          <p:cNvPr id="364" name="Google Shape;364;p40"/>
+          <p:cNvPr id="366" name="Google Shape;366;p40"/>
           <p:cNvSpPr txBox="1"/>
           <p:nvPr>
             <p:ph idx="1" type="body"/>
@@ -17976,7 +18032,7 @@
       </p:sp>
       <p:sp>
         <p:nvSpPr>
-          <p:cNvPr id="365" name="Google Shape;365;p40"/>
+          <p:cNvPr id="367" name="Google Shape;367;p40"/>
           <p:cNvSpPr txBox="1"/>
           <p:nvPr>
             <p:ph idx="1" type="body"/>
@@ -18022,7 +18078,7 @@
       </p:sp>
       <p:sp>
         <p:nvSpPr>
-          <p:cNvPr id="366" name="Google Shape;366;p40"/>
+          <p:cNvPr id="368" name="Google Shape;368;p40"/>
           <p:cNvSpPr txBox="1"/>
           <p:nvPr>
             <p:ph idx="1" type="body"/>
@@ -18065,7 +18121,7 @@
       </p:sp>
       <p:sp>
         <p:nvSpPr>
-          <p:cNvPr id="367" name="Google Shape;367;p40"/>
+          <p:cNvPr id="369" name="Google Shape;369;p40"/>
           <p:cNvSpPr txBox="1"/>
           <p:nvPr/>
         </p:nvSpPr>
@@ -18118,7 +18174,7 @@
       </p:sp>
       <p:sp>
         <p:nvSpPr>
-          <p:cNvPr id="368" name="Google Shape;368;p40"/>
+          <p:cNvPr id="370" name="Google Shape;370;p40"/>
           <p:cNvSpPr/>
           <p:nvPr/>
         </p:nvSpPr>
@@ -18171,7 +18227,7 @@
       </p:sp>
       <p:sp>
         <p:nvSpPr>
-          <p:cNvPr id="369" name="Google Shape;369;p40"/>
+          <p:cNvPr id="371" name="Google Shape;371;p40"/>
           <p:cNvSpPr/>
           <p:nvPr/>
         </p:nvSpPr>
@@ -18224,14 +18280,14 @@
       </p:sp>
       <p:sp>
         <p:nvSpPr>
-          <p:cNvPr id="370" name="Google Shape;370;p40"/>
+          <p:cNvPr id="372" name="Google Shape;372;p40"/>
           <p:cNvSpPr txBox="1"/>
           <p:nvPr/>
         </p:nvSpPr>
         <p:spPr>
           <a:xfrm>
-            <a:off x="1344219" y="3285325"/>
-            <a:ext cx="4421400" cy="461700"/>
+            <a:off x="1344225" y="3285325"/>
+            <a:ext cx="2404200" cy="780300"/>
           </a:xfrm>
           <a:prstGeom prst="rect">
             <a:avLst/>
@@ -18275,6 +18331,62 @@
           </a:p>
         </p:txBody>
       </p:sp>
+      <p:pic>
+        <p:nvPicPr>
+          <p:cNvPr id="373" name="Google Shape;373;p40"/>
+          <p:cNvPicPr preferRelativeResize="0"/>
+          <p:nvPr/>
+        </p:nvPicPr>
+        <p:blipFill>
+          <a:blip r:embed="rId6">
+            <a:alphaModFix/>
+          </a:blip>
+          <a:stretch>
+            <a:fillRect/>
+          </a:stretch>
+        </p:blipFill>
+        <p:spPr>
+          <a:xfrm>
+            <a:off x="4238875" y="1852125"/>
+            <a:ext cx="3310225" cy="1588150"/>
+          </a:xfrm>
+          <a:prstGeom prst="rect">
+            <a:avLst/>
+          </a:prstGeom>
+          <a:noFill/>
+          <a:ln>
+            <a:noFill/>
+          </a:ln>
+        </p:spPr>
+      </p:pic>
+      <p:pic>
+        <p:nvPicPr>
+          <p:cNvPr id="374" name="Google Shape;374;p40"/>
+          <p:cNvPicPr preferRelativeResize="0"/>
+          <p:nvPr/>
+        </p:nvPicPr>
+        <p:blipFill>
+          <a:blip r:embed="rId7">
+            <a:alphaModFix/>
+          </a:blip>
+          <a:stretch>
+            <a:fillRect/>
+          </a:stretch>
+        </p:blipFill>
+        <p:spPr>
+          <a:xfrm>
+            <a:off x="6290975" y="2310171"/>
+            <a:ext cx="2685425" cy="2730625"/>
+          </a:xfrm>
+          <a:prstGeom prst="rect">
+            <a:avLst/>
+          </a:prstGeom>
+          <a:noFill/>
+          <a:ln>
+            <a:noFill/>
+          </a:ln>
+        </p:spPr>
+      </p:pic>
     </p:spTree>
   </p:cSld>
   <p:clrMapOvr>
@@ -18288,7 +18400,7 @@
   <p:cSld>
     <p:spTree>
       <p:nvGrpSpPr>
-        <p:cNvPr id="374" name="Shape 374"/>
+        <p:cNvPr id="378" name="Shape 378"/>
         <p:cNvGrpSpPr/>
         <p:nvPr/>
       </p:nvGrpSpPr>
@@ -18302,7 +18414,7 @@
       </p:grpSpPr>
       <p:sp>
         <p:nvSpPr>
-          <p:cNvPr id="375" name="Google Shape;375;p41"/>
+          <p:cNvPr id="379" name="Google Shape;379;p41"/>
           <p:cNvSpPr txBox="1"/>
           <p:nvPr>
             <p:ph type="title"/>
@@ -18343,7 +18455,7 @@
       </p:sp>
       <p:sp>
         <p:nvSpPr>
-          <p:cNvPr id="376" name="Google Shape;376;p41"/>
+          <p:cNvPr id="380" name="Google Shape;380;p41"/>
           <p:cNvSpPr txBox="1"/>
           <p:nvPr/>
         </p:nvSpPr>
@@ -18390,7 +18502,7 @@
       </p:sp>
       <p:sp>
         <p:nvSpPr>
-          <p:cNvPr id="377" name="Google Shape;377;p41"/>
+          <p:cNvPr id="381" name="Google Shape;381;p41"/>
           <p:cNvSpPr txBox="1"/>
           <p:nvPr>
             <p:ph idx="1" type="body"/>
@@ -18433,7 +18545,7 @@
       </p:sp>
       <p:sp>
         <p:nvSpPr>
-          <p:cNvPr id="378" name="Google Shape;378;p41"/>
+          <p:cNvPr id="382" name="Google Shape;382;p41"/>
           <p:cNvSpPr txBox="1"/>
           <p:nvPr>
             <p:ph idx="1" type="body"/>
@@ -18479,7 +18591,7 @@
       </p:sp>
       <p:sp>
         <p:nvSpPr>
-          <p:cNvPr id="379" name="Google Shape;379;p41"/>
+          <p:cNvPr id="383" name="Google Shape;383;p41"/>
           <p:cNvSpPr txBox="1"/>
           <p:nvPr>
             <p:ph idx="1" type="body"/>
@@ -18522,7 +18634,7 @@
       </p:sp>
       <p:sp>
         <p:nvSpPr>
-          <p:cNvPr id="380" name="Google Shape;380;p41"/>
+          <p:cNvPr id="384" name="Google Shape;384;p41"/>
           <p:cNvSpPr txBox="1"/>
           <p:nvPr/>
         </p:nvSpPr>
@@ -18575,7 +18687,7 @@
       </p:sp>
       <p:sp>
         <p:nvSpPr>
-          <p:cNvPr id="381" name="Google Shape;381;p41"/>
+          <p:cNvPr id="385" name="Google Shape;385;p41"/>
           <p:cNvSpPr/>
           <p:nvPr/>
         </p:nvSpPr>
@@ -18628,7 +18740,7 @@
       </p:sp>
       <p:sp>
         <p:nvSpPr>
-          <p:cNvPr id="382" name="Google Shape;382;p41"/>
+          <p:cNvPr id="386" name="Google Shape;386;p41"/>
           <p:cNvSpPr/>
           <p:nvPr/>
         </p:nvSpPr>
@@ -18681,14 +18793,14 @@
       </p:sp>
       <p:sp>
         <p:nvSpPr>
-          <p:cNvPr id="383" name="Google Shape;383;p41"/>
+          <p:cNvPr id="387" name="Google Shape;387;p41"/>
           <p:cNvSpPr txBox="1"/>
           <p:nvPr/>
         </p:nvSpPr>
         <p:spPr>
           <a:xfrm>
-            <a:off x="1344219" y="3285325"/>
-            <a:ext cx="4421400" cy="461700"/>
+            <a:off x="1344225" y="3285325"/>
+            <a:ext cx="2404200" cy="780300"/>
           </a:xfrm>
           <a:prstGeom prst="rect">
             <a:avLst/>
@@ -18732,6 +18844,62 @@
           </a:p>
         </p:txBody>
       </p:sp>
+      <p:pic>
+        <p:nvPicPr>
+          <p:cNvPr id="388" name="Google Shape;388;p41"/>
+          <p:cNvPicPr preferRelativeResize="0"/>
+          <p:nvPr/>
+        </p:nvPicPr>
+        <p:blipFill>
+          <a:blip r:embed="rId5">
+            <a:alphaModFix/>
+          </a:blip>
+          <a:stretch>
+            <a:fillRect/>
+          </a:stretch>
+        </p:blipFill>
+        <p:spPr>
+          <a:xfrm>
+            <a:off x="4364925" y="1989925"/>
+            <a:ext cx="3533775" cy="1295400"/>
+          </a:xfrm>
+          <a:prstGeom prst="rect">
+            <a:avLst/>
+          </a:prstGeom>
+          <a:noFill/>
+          <a:ln>
+            <a:noFill/>
+          </a:ln>
+        </p:spPr>
+      </p:pic>
+      <p:pic>
+        <p:nvPicPr>
+          <p:cNvPr id="389" name="Google Shape;389;p41"/>
+          <p:cNvPicPr preferRelativeResize="0"/>
+          <p:nvPr/>
+        </p:nvPicPr>
+        <p:blipFill>
+          <a:blip r:embed="rId6">
+            <a:alphaModFix/>
+          </a:blip>
+          <a:stretch>
+            <a:fillRect/>
+          </a:stretch>
+        </p:blipFill>
+        <p:spPr>
+          <a:xfrm>
+            <a:off x="4369688" y="3362075"/>
+            <a:ext cx="3524250" cy="1457325"/>
+          </a:xfrm>
+          <a:prstGeom prst="rect">
+            <a:avLst/>
+          </a:prstGeom>
+          <a:noFill/>
+          <a:ln>
+            <a:noFill/>
+          </a:ln>
+        </p:spPr>
+      </p:pic>
     </p:spTree>
   </p:cSld>
   <p:clrMapOvr>
@@ -19241,7 +19409,7 @@
   <p:cSld>
     <p:spTree>
       <p:nvGrpSpPr>
-        <p:cNvPr id="387" name="Shape 387"/>
+        <p:cNvPr id="393" name="Shape 393"/>
         <p:cNvGrpSpPr/>
         <p:nvPr/>
       </p:nvGrpSpPr>
@@ -19255,7 +19423,7 @@
       </p:grpSpPr>
       <p:sp>
         <p:nvSpPr>
-          <p:cNvPr id="388" name="Google Shape;388;p42"/>
+          <p:cNvPr id="394" name="Google Shape;394;p42"/>
           <p:cNvSpPr txBox="1"/>
           <p:nvPr>
             <p:ph type="title"/>
@@ -19295,7 +19463,7 @@
       </p:sp>
       <p:sp>
         <p:nvSpPr>
-          <p:cNvPr id="389" name="Google Shape;389;p42"/>
+          <p:cNvPr id="395" name="Google Shape;395;p42"/>
           <p:cNvSpPr txBox="1"/>
           <p:nvPr/>
         </p:nvSpPr>
@@ -19351,7 +19519,7 @@
       </p:sp>
       <p:sp>
         <p:nvSpPr>
-          <p:cNvPr id="390" name="Google Shape;390;p42"/>
+          <p:cNvPr id="396" name="Google Shape;396;p42"/>
           <p:cNvSpPr txBox="1"/>
           <p:nvPr/>
         </p:nvSpPr>
@@ -19404,7 +19572,7 @@
       </p:sp>
       <p:sp>
         <p:nvSpPr>
-          <p:cNvPr id="391" name="Google Shape;391;p42"/>
+          <p:cNvPr id="397" name="Google Shape;397;p42"/>
           <p:cNvSpPr/>
           <p:nvPr/>
         </p:nvSpPr>
@@ -19457,7 +19625,7 @@
       </p:sp>
       <p:sp>
         <p:nvSpPr>
-          <p:cNvPr id="392" name="Google Shape;392;p42"/>
+          <p:cNvPr id="398" name="Google Shape;398;p42"/>
           <p:cNvSpPr txBox="1"/>
           <p:nvPr>
             <p:ph idx="1" type="body"/>
@@ -19506,7 +19674,7 @@
       </p:sp>
       <p:pic>
         <p:nvPicPr>
-          <p:cNvPr id="393" name="Google Shape;393;p42"/>
+          <p:cNvPr id="399" name="Google Shape;399;p42"/>
           <p:cNvPicPr preferRelativeResize="0"/>
           <p:nvPr/>
         </p:nvPicPr>
@@ -19534,7 +19702,7 @@
       </p:pic>
       <p:pic>
         <p:nvPicPr>
-          <p:cNvPr id="394" name="Google Shape;394;p42"/>
+          <p:cNvPr id="400" name="Google Shape;400;p42"/>
           <p:cNvPicPr preferRelativeResize="0"/>
           <p:nvPr/>
         </p:nvPicPr>
@@ -19573,7 +19741,7 @@
   <p:cSld>
     <p:spTree>
       <p:nvGrpSpPr>
-        <p:cNvPr id="398" name="Shape 398"/>
+        <p:cNvPr id="404" name="Shape 404"/>
         <p:cNvGrpSpPr/>
         <p:nvPr/>
       </p:nvGrpSpPr>
@@ -19587,7 +19755,7 @@
       </p:grpSpPr>
       <p:sp>
         <p:nvSpPr>
-          <p:cNvPr id="399" name="Google Shape;399;p43"/>
+          <p:cNvPr id="405" name="Google Shape;405;p43"/>
           <p:cNvSpPr txBox="1"/>
           <p:nvPr/>
         </p:nvSpPr>
@@ -19640,7 +19808,7 @@
       </p:sp>
       <p:sp>
         <p:nvSpPr>
-          <p:cNvPr id="400" name="Google Shape;400;p43"/>
+          <p:cNvPr id="406" name="Google Shape;406;p43"/>
           <p:cNvSpPr/>
           <p:nvPr/>
         </p:nvSpPr>
@@ -19693,7 +19861,7 @@
       </p:sp>
       <p:pic>
         <p:nvPicPr>
-          <p:cNvPr id="401" name="Google Shape;401;p43"/>
+          <p:cNvPr id="407" name="Google Shape;407;p43"/>
           <p:cNvPicPr preferRelativeResize="0"/>
           <p:nvPr/>
         </p:nvPicPr>
@@ -19721,7 +19889,7 @@
       </p:pic>
       <p:pic>
         <p:nvPicPr>
-          <p:cNvPr id="402" name="Google Shape;402;p43"/>
+          <p:cNvPr id="408" name="Google Shape;408;p43"/>
           <p:cNvPicPr preferRelativeResize="0"/>
           <p:nvPr/>
         </p:nvPicPr>
@@ -19760,7 +19928,7 @@
   <p:cSld>
     <p:spTree>
       <p:nvGrpSpPr>
-        <p:cNvPr id="406" name="Shape 406"/>
+        <p:cNvPr id="412" name="Shape 412"/>
         <p:cNvGrpSpPr/>
         <p:nvPr/>
       </p:nvGrpSpPr>
@@ -19774,7 +19942,7 @@
       </p:grpSpPr>
       <p:sp>
         <p:nvSpPr>
-          <p:cNvPr id="407" name="Google Shape;407;p44"/>
+          <p:cNvPr id="413" name="Google Shape;413;p44"/>
           <p:cNvSpPr txBox="1"/>
           <p:nvPr/>
         </p:nvSpPr>
@@ -19830,7 +19998,7 @@
       </p:sp>
       <p:sp>
         <p:nvSpPr>
-          <p:cNvPr id="408" name="Google Shape;408;p44"/>
+          <p:cNvPr id="414" name="Google Shape;414;p44"/>
           <p:cNvSpPr txBox="1"/>
           <p:nvPr>
             <p:ph idx="1" type="body"/>
@@ -19873,7 +20041,7 @@
       </p:sp>
       <p:sp>
         <p:nvSpPr>
-          <p:cNvPr id="409" name="Google Shape;409;p44"/>
+          <p:cNvPr id="415" name="Google Shape;415;p44"/>
           <p:cNvSpPr txBox="1"/>
           <p:nvPr>
             <p:ph idx="1" type="body"/>
@@ -19919,7 +20087,7 @@
       </p:sp>
       <p:sp>
         <p:nvSpPr>
-          <p:cNvPr id="410" name="Google Shape;410;p44"/>
+          <p:cNvPr id="416" name="Google Shape;416;p44"/>
           <p:cNvSpPr txBox="1"/>
           <p:nvPr>
             <p:ph idx="1" type="body"/>
@@ -19962,7 +20130,7 @@
       </p:sp>
       <p:sp>
         <p:nvSpPr>
-          <p:cNvPr id="411" name="Google Shape;411;p44"/>
+          <p:cNvPr id="417" name="Google Shape;417;p44"/>
           <p:cNvSpPr txBox="1"/>
           <p:nvPr>
             <p:ph type="title"/>
@@ -20007,7 +20175,7 @@
       </p:sp>
       <p:sp>
         <p:nvSpPr>
-          <p:cNvPr id="412" name="Google Shape;412;p44"/>
+          <p:cNvPr id="418" name="Google Shape;418;p44"/>
           <p:cNvSpPr txBox="1"/>
           <p:nvPr/>
         </p:nvSpPr>
@@ -20060,7 +20228,7 @@
       </p:sp>
       <p:sp>
         <p:nvSpPr>
-          <p:cNvPr id="413" name="Google Shape;413;p44"/>
+          <p:cNvPr id="419" name="Google Shape;419;p44"/>
           <p:cNvSpPr/>
           <p:nvPr/>
         </p:nvSpPr>
@@ -20113,7 +20281,7 @@
       </p:sp>
       <p:sp>
         <p:nvSpPr>
-          <p:cNvPr id="414" name="Google Shape;414;p44"/>
+          <p:cNvPr id="420" name="Google Shape;420;p44"/>
           <p:cNvSpPr/>
           <p:nvPr/>
         </p:nvSpPr>
@@ -20166,7 +20334,7 @@
       </p:sp>
       <p:sp>
         <p:nvSpPr>
-          <p:cNvPr id="415" name="Google Shape;415;p44"/>
+          <p:cNvPr id="421" name="Google Shape;421;p44"/>
           <p:cNvSpPr txBox="1"/>
           <p:nvPr/>
         </p:nvSpPr>
@@ -20217,6 +20385,62 @@
           </a:p>
         </p:txBody>
       </p:sp>
+      <p:pic>
+        <p:nvPicPr>
+          <p:cNvPr id="422" name="Google Shape;422;p44"/>
+          <p:cNvPicPr preferRelativeResize="0"/>
+          <p:nvPr/>
+        </p:nvPicPr>
+        <p:blipFill>
+          <a:blip r:embed="rId6">
+            <a:alphaModFix/>
+          </a:blip>
+          <a:stretch>
+            <a:fillRect/>
+          </a:stretch>
+        </p:blipFill>
+        <p:spPr>
+          <a:xfrm>
+            <a:off x="5061275" y="2385525"/>
+            <a:ext cx="1865300" cy="2048075"/>
+          </a:xfrm>
+          <a:prstGeom prst="rect">
+            <a:avLst/>
+          </a:prstGeom>
+          <a:noFill/>
+          <a:ln>
+            <a:noFill/>
+          </a:ln>
+        </p:spPr>
+      </p:pic>
+      <p:pic>
+        <p:nvPicPr>
+          <p:cNvPr id="423" name="Google Shape;423;p44"/>
+          <p:cNvPicPr preferRelativeResize="0"/>
+          <p:nvPr/>
+        </p:nvPicPr>
+        <p:blipFill>
+          <a:blip r:embed="rId7">
+            <a:alphaModFix/>
+          </a:blip>
+          <a:stretch>
+            <a:fillRect/>
+          </a:stretch>
+        </p:blipFill>
+        <p:spPr>
+          <a:xfrm>
+            <a:off x="7013199" y="2385537"/>
+            <a:ext cx="1936850" cy="2284875"/>
+          </a:xfrm>
+          <a:prstGeom prst="rect">
+            <a:avLst/>
+          </a:prstGeom>
+          <a:noFill/>
+          <a:ln>
+            <a:noFill/>
+          </a:ln>
+        </p:spPr>
+      </p:pic>
     </p:spTree>
   </p:cSld>
   <p:clrMapOvr>
@@ -20230,7 +20454,7 @@
   <p:cSld>
     <p:spTree>
       <p:nvGrpSpPr>
-        <p:cNvPr id="419" name="Shape 419"/>
+        <p:cNvPr id="427" name="Shape 427"/>
         <p:cNvGrpSpPr/>
         <p:nvPr/>
       </p:nvGrpSpPr>
@@ -20244,7 +20468,7 @@
       </p:grpSpPr>
       <p:sp>
         <p:nvSpPr>
-          <p:cNvPr id="420" name="Google Shape;420;p45"/>
+          <p:cNvPr id="428" name="Google Shape;428;p45"/>
           <p:cNvSpPr txBox="1"/>
           <p:nvPr>
             <p:ph type="title"/>
@@ -20285,7 +20509,7 @@
       </p:sp>
       <p:sp>
         <p:nvSpPr>
-          <p:cNvPr id="421" name="Google Shape;421;p45"/>
+          <p:cNvPr id="429" name="Google Shape;429;p45"/>
           <p:cNvSpPr txBox="1"/>
           <p:nvPr/>
         </p:nvSpPr>
@@ -20341,7 +20565,7 @@
       </p:sp>
       <p:sp>
         <p:nvSpPr>
-          <p:cNvPr id="422" name="Google Shape;422;p45"/>
+          <p:cNvPr id="430" name="Google Shape;430;p45"/>
           <p:cNvSpPr txBox="1"/>
           <p:nvPr>
             <p:ph idx="1" type="body"/>
@@ -20384,7 +20608,7 @@
       </p:sp>
       <p:sp>
         <p:nvSpPr>
-          <p:cNvPr id="423" name="Google Shape;423;p45"/>
+          <p:cNvPr id="431" name="Google Shape;431;p45"/>
           <p:cNvSpPr txBox="1"/>
           <p:nvPr>
             <p:ph idx="1" type="body"/>
@@ -20430,7 +20654,7 @@
       </p:sp>
       <p:sp>
         <p:nvSpPr>
-          <p:cNvPr id="424" name="Google Shape;424;p45"/>
+          <p:cNvPr id="432" name="Google Shape;432;p45"/>
           <p:cNvSpPr txBox="1"/>
           <p:nvPr>
             <p:ph idx="1" type="body"/>
@@ -20473,7 +20697,7 @@
       </p:sp>
       <p:sp>
         <p:nvSpPr>
-          <p:cNvPr id="425" name="Google Shape;425;p45"/>
+          <p:cNvPr id="433" name="Google Shape;433;p45"/>
           <p:cNvSpPr txBox="1"/>
           <p:nvPr/>
         </p:nvSpPr>
@@ -20526,7 +20750,7 @@
       </p:sp>
       <p:sp>
         <p:nvSpPr>
-          <p:cNvPr id="426" name="Google Shape;426;p45"/>
+          <p:cNvPr id="434" name="Google Shape;434;p45"/>
           <p:cNvSpPr/>
           <p:nvPr/>
         </p:nvSpPr>
@@ -20579,7 +20803,7 @@
       </p:sp>
       <p:sp>
         <p:nvSpPr>
-          <p:cNvPr id="427" name="Google Shape;427;p45"/>
+          <p:cNvPr id="435" name="Google Shape;435;p45"/>
           <p:cNvSpPr/>
           <p:nvPr/>
         </p:nvSpPr>
@@ -20632,7 +20856,7 @@
       </p:sp>
       <p:sp>
         <p:nvSpPr>
-          <p:cNvPr id="428" name="Google Shape;428;p45"/>
+          <p:cNvPr id="436" name="Google Shape;436;p45"/>
           <p:cNvSpPr txBox="1"/>
           <p:nvPr/>
         </p:nvSpPr>
@@ -20683,6 +20907,62 @@
           </a:p>
         </p:txBody>
       </p:sp>
+      <p:pic>
+        <p:nvPicPr>
+          <p:cNvPr id="437" name="Google Shape;437;p45"/>
+          <p:cNvPicPr preferRelativeResize="0"/>
+          <p:nvPr/>
+        </p:nvPicPr>
+        <p:blipFill>
+          <a:blip r:embed="rId6">
+            <a:alphaModFix/>
+          </a:blip>
+          <a:stretch>
+            <a:fillRect/>
+          </a:stretch>
+        </p:blipFill>
+        <p:spPr>
+          <a:xfrm>
+            <a:off x="5169825" y="2165000"/>
+            <a:ext cx="3562350" cy="1085850"/>
+          </a:xfrm>
+          <a:prstGeom prst="rect">
+            <a:avLst/>
+          </a:prstGeom>
+          <a:noFill/>
+          <a:ln>
+            <a:noFill/>
+          </a:ln>
+        </p:spPr>
+      </p:pic>
+      <p:pic>
+        <p:nvPicPr>
+          <p:cNvPr id="438" name="Google Shape;438;p45"/>
+          <p:cNvPicPr preferRelativeResize="0"/>
+          <p:nvPr/>
+        </p:nvPicPr>
+        <p:blipFill>
+          <a:blip r:embed="rId7">
+            <a:alphaModFix/>
+          </a:blip>
+          <a:stretch>
+            <a:fillRect/>
+          </a:stretch>
+        </p:blipFill>
+        <p:spPr>
+          <a:xfrm>
+            <a:off x="5169825" y="3395175"/>
+            <a:ext cx="3562350" cy="876300"/>
+          </a:xfrm>
+          <a:prstGeom prst="rect">
+            <a:avLst/>
+          </a:prstGeom>
+          <a:noFill/>
+          <a:ln>
+            <a:noFill/>
+          </a:ln>
+        </p:spPr>
+      </p:pic>
     </p:spTree>
   </p:cSld>
   <p:clrMapOvr>
@@ -20696,7 +20976,7 @@
   <p:cSld>
     <p:spTree>
       <p:nvGrpSpPr>
-        <p:cNvPr id="432" name="Shape 432"/>
+        <p:cNvPr id="442" name="Shape 442"/>
         <p:cNvGrpSpPr/>
         <p:nvPr/>
       </p:nvGrpSpPr>
@@ -20710,7 +20990,7 @@
       </p:grpSpPr>
       <p:sp>
         <p:nvSpPr>
-          <p:cNvPr id="433" name="Google Shape;433;p46"/>
+          <p:cNvPr id="443" name="Google Shape;443;p46"/>
           <p:cNvSpPr txBox="1"/>
           <p:nvPr>
             <p:ph type="title"/>
@@ -20750,7 +21030,7 @@
       </p:sp>
       <p:sp>
         <p:nvSpPr>
-          <p:cNvPr id="434" name="Google Shape;434;p46"/>
+          <p:cNvPr id="444" name="Google Shape;444;p46"/>
           <p:cNvSpPr txBox="1"/>
           <p:nvPr/>
         </p:nvSpPr>
@@ -20806,7 +21086,7 @@
       </p:sp>
       <p:sp>
         <p:nvSpPr>
-          <p:cNvPr id="435" name="Google Shape;435;p46"/>
+          <p:cNvPr id="445" name="Google Shape;445;p46"/>
           <p:cNvSpPr txBox="1"/>
           <p:nvPr/>
         </p:nvSpPr>
@@ -20859,7 +21139,7 @@
       </p:sp>
       <p:sp>
         <p:nvSpPr>
-          <p:cNvPr id="436" name="Google Shape;436;p46"/>
+          <p:cNvPr id="446" name="Google Shape;446;p46"/>
           <p:cNvSpPr/>
           <p:nvPr/>
         </p:nvSpPr>
@@ -20912,7 +21192,7 @@
       </p:sp>
       <p:sp>
         <p:nvSpPr>
-          <p:cNvPr id="437" name="Google Shape;437;p46"/>
+          <p:cNvPr id="447" name="Google Shape;447;p46"/>
           <p:cNvSpPr txBox="1"/>
           <p:nvPr>
             <p:ph idx="1" type="body"/>
@@ -20961,7 +21241,7 @@
       </p:sp>
       <p:pic>
         <p:nvPicPr>
-          <p:cNvPr id="438" name="Google Shape;438;p46"/>
+          <p:cNvPr id="448" name="Google Shape;448;p46"/>
           <p:cNvPicPr preferRelativeResize="0"/>
           <p:nvPr/>
         </p:nvPicPr>
@@ -20989,7 +21269,7 @@
       </p:pic>
       <p:pic>
         <p:nvPicPr>
-          <p:cNvPr id="439" name="Google Shape;439;p46"/>
+          <p:cNvPr id="449" name="Google Shape;449;p46"/>
           <p:cNvPicPr preferRelativeResize="0"/>
           <p:nvPr/>
         </p:nvPicPr>
@@ -21028,7 +21308,7 @@
   <p:cSld>
     <p:spTree>
       <p:nvGrpSpPr>
-        <p:cNvPr id="443" name="Shape 443"/>
+        <p:cNvPr id="453" name="Shape 453"/>
         <p:cNvGrpSpPr/>
         <p:nvPr/>
       </p:nvGrpSpPr>
@@ -21042,7 +21322,7 @@
       </p:grpSpPr>
       <p:pic>
         <p:nvPicPr>
-          <p:cNvPr id="444" name="Google Shape;444;p47"/>
+          <p:cNvPr id="454" name="Google Shape;454;p47"/>
           <p:cNvPicPr preferRelativeResize="0"/>
           <p:nvPr/>
         </p:nvPicPr>
@@ -21070,7 +21350,7 @@
       </p:pic>
       <p:pic>
         <p:nvPicPr>
-          <p:cNvPr id="445" name="Google Shape;445;p47"/>
+          <p:cNvPr id="455" name="Google Shape;455;p47"/>
           <p:cNvPicPr preferRelativeResize="0"/>
           <p:nvPr/>
         </p:nvPicPr>
@@ -21109,7 +21389,7 @@
   <p:cSld>
     <p:spTree>
       <p:nvGrpSpPr>
-        <p:cNvPr id="449" name="Shape 449"/>
+        <p:cNvPr id="459" name="Shape 459"/>
         <p:cNvGrpSpPr/>
         <p:nvPr/>
       </p:nvGrpSpPr>
@@ -21123,7 +21403,7 @@
       </p:grpSpPr>
       <p:sp>
         <p:nvSpPr>
-          <p:cNvPr id="450" name="Google Shape;450;p48"/>
+          <p:cNvPr id="460" name="Google Shape;460;p48"/>
           <p:cNvSpPr txBox="1"/>
           <p:nvPr/>
         </p:nvSpPr>
@@ -21176,7 +21456,7 @@
       </p:sp>
       <p:sp>
         <p:nvSpPr>
-          <p:cNvPr id="451" name="Google Shape;451;p48"/>
+          <p:cNvPr id="461" name="Google Shape;461;p48"/>
           <p:cNvSpPr/>
           <p:nvPr/>
         </p:nvSpPr>
@@ -21229,7 +21509,7 @@
       </p:sp>
       <p:pic>
         <p:nvPicPr>
-          <p:cNvPr id="452" name="Google Shape;452;p48"/>
+          <p:cNvPr id="462" name="Google Shape;462;p48"/>
           <p:cNvPicPr preferRelativeResize="0"/>
           <p:nvPr/>
         </p:nvPicPr>
@@ -21257,7 +21537,7 @@
       </p:pic>
       <p:pic>
         <p:nvPicPr>
-          <p:cNvPr id="453" name="Google Shape;453;p48"/>
+          <p:cNvPr id="463" name="Google Shape;463;p48"/>
           <p:cNvPicPr preferRelativeResize="0"/>
           <p:nvPr/>
         </p:nvPicPr>
@@ -21285,7 +21565,7 @@
       </p:pic>
       <p:cxnSp>
         <p:nvCxnSpPr>
-          <p:cNvPr id="454" name="Google Shape;454;p48"/>
+          <p:cNvPr id="464" name="Google Shape;464;p48"/>
           <p:cNvCxnSpPr/>
           <p:nvPr/>
         </p:nvCxnSpPr>
@@ -21311,7 +21591,7 @@
       </p:cxnSp>
       <p:sp>
         <p:nvSpPr>
-          <p:cNvPr id="455" name="Google Shape;455;p48"/>
+          <p:cNvPr id="465" name="Google Shape;465;p48"/>
           <p:cNvSpPr txBox="1"/>
           <p:nvPr/>
         </p:nvSpPr>
@@ -21376,7 +21656,7 @@
       </p:sp>
       <p:sp>
         <p:nvSpPr>
-          <p:cNvPr id="456" name="Google Shape;456;p48"/>
+          <p:cNvPr id="466" name="Google Shape;466;p48"/>
           <p:cNvSpPr/>
           <p:nvPr/>
         </p:nvSpPr>
@@ -21429,7 +21709,7 @@
       </p:sp>
       <p:pic>
         <p:nvPicPr>
-          <p:cNvPr id="457" name="Google Shape;457;p48"/>
+          <p:cNvPr id="467" name="Google Shape;467;p48"/>
           <p:cNvPicPr preferRelativeResize="0"/>
           <p:nvPr/>
         </p:nvPicPr>
@@ -21457,7 +21737,7 @@
       </p:pic>
       <p:pic>
         <p:nvPicPr>
-          <p:cNvPr id="458" name="Google Shape;458;p48"/>
+          <p:cNvPr id="468" name="Google Shape;468;p48"/>
           <p:cNvPicPr preferRelativeResize="0"/>
           <p:nvPr/>
         </p:nvPicPr>
@@ -21496,7 +21776,7 @@
   <p:cSld>
     <p:spTree>
       <p:nvGrpSpPr>
-        <p:cNvPr id="462" name="Shape 462"/>
+        <p:cNvPr id="472" name="Shape 472"/>
         <p:cNvGrpSpPr/>
         <p:nvPr/>
       </p:nvGrpSpPr>
@@ -21510,7 +21790,7 @@
       </p:grpSpPr>
       <p:sp>
         <p:nvSpPr>
-          <p:cNvPr id="463" name="Google Shape;463;p49"/>
+          <p:cNvPr id="473" name="Google Shape;473;p49"/>
           <p:cNvSpPr txBox="1"/>
           <p:nvPr/>
         </p:nvSpPr>
@@ -21566,7 +21846,7 @@
       </p:sp>
       <p:sp>
         <p:nvSpPr>
-          <p:cNvPr id="464" name="Google Shape;464;p49"/>
+          <p:cNvPr id="474" name="Google Shape;474;p49"/>
           <p:cNvSpPr txBox="1"/>
           <p:nvPr>
             <p:ph idx="1" type="body"/>
@@ -21609,7 +21889,7 @@
       </p:sp>
       <p:sp>
         <p:nvSpPr>
-          <p:cNvPr id="465" name="Google Shape;465;p49"/>
+          <p:cNvPr id="475" name="Google Shape;475;p49"/>
           <p:cNvSpPr txBox="1"/>
           <p:nvPr>
             <p:ph idx="1" type="body"/>
@@ -21655,7 +21935,7 @@
       </p:sp>
       <p:sp>
         <p:nvSpPr>
-          <p:cNvPr id="466" name="Google Shape;466;p49"/>
+          <p:cNvPr id="476" name="Google Shape;476;p49"/>
           <p:cNvSpPr txBox="1"/>
           <p:nvPr>
             <p:ph idx="1" type="body"/>
@@ -21698,7 +21978,7 @@
       </p:sp>
       <p:sp>
         <p:nvSpPr>
-          <p:cNvPr id="467" name="Google Shape;467;p49"/>
+          <p:cNvPr id="477" name="Google Shape;477;p49"/>
           <p:cNvSpPr txBox="1"/>
           <p:nvPr>
             <p:ph type="title"/>
@@ -21738,7 +22018,7 @@
       </p:sp>
       <p:sp>
         <p:nvSpPr>
-          <p:cNvPr id="468" name="Google Shape;468;p49"/>
+          <p:cNvPr id="478" name="Google Shape;478;p49"/>
           <p:cNvSpPr txBox="1"/>
           <p:nvPr/>
         </p:nvSpPr>
@@ -21791,7 +22071,7 @@
       </p:sp>
       <p:sp>
         <p:nvSpPr>
-          <p:cNvPr id="469" name="Google Shape;469;p49"/>
+          <p:cNvPr id="479" name="Google Shape;479;p49"/>
           <p:cNvSpPr/>
           <p:nvPr/>
         </p:nvSpPr>
@@ -21844,7 +22124,7 @@
       </p:sp>
       <p:sp>
         <p:nvSpPr>
-          <p:cNvPr id="470" name="Google Shape;470;p49"/>
+          <p:cNvPr id="480" name="Google Shape;480;p49"/>
           <p:cNvSpPr/>
           <p:nvPr/>
         </p:nvSpPr>
@@ -21897,7 +22177,7 @@
       </p:sp>
       <p:sp>
         <p:nvSpPr>
-          <p:cNvPr id="471" name="Google Shape;471;p49"/>
+          <p:cNvPr id="481" name="Google Shape;481;p49"/>
           <p:cNvSpPr/>
           <p:nvPr/>
         </p:nvSpPr>
@@ -21950,7 +22230,7 @@
       </p:sp>
       <p:sp>
         <p:nvSpPr>
-          <p:cNvPr id="472" name="Google Shape;472;p49"/>
+          <p:cNvPr id="482" name="Google Shape;482;p49"/>
           <p:cNvSpPr txBox="1"/>
           <p:nvPr/>
         </p:nvSpPr>
@@ -22003,7 +22283,7 @@
       </p:sp>
       <p:sp>
         <p:nvSpPr>
-          <p:cNvPr id="473" name="Google Shape;473;p49"/>
+          <p:cNvPr id="483" name="Google Shape;483;p49"/>
           <p:cNvSpPr txBox="1"/>
           <p:nvPr/>
         </p:nvSpPr>
@@ -22056,7 +22336,7 @@
       </p:sp>
       <p:sp>
         <p:nvSpPr>
-          <p:cNvPr id="474" name="Google Shape;474;p49"/>
+          <p:cNvPr id="484" name="Google Shape;484;p49"/>
           <p:cNvSpPr txBox="1"/>
           <p:nvPr/>
         </p:nvSpPr>
@@ -22109,7 +22389,7 @@
       </p:sp>
       <p:sp>
         <p:nvSpPr>
-          <p:cNvPr id="475" name="Google Shape;475;p49"/>
+          <p:cNvPr id="485" name="Google Shape;485;p49"/>
           <p:cNvSpPr/>
           <p:nvPr/>
         </p:nvSpPr>
@@ -22160,6 +22440,62 @@
           </a:p>
         </p:txBody>
       </p:sp>
+      <p:pic>
+        <p:nvPicPr>
+          <p:cNvPr id="486" name="Google Shape;486;p49"/>
+          <p:cNvPicPr preferRelativeResize="0"/>
+          <p:nvPr/>
+        </p:nvPicPr>
+        <p:blipFill>
+          <a:blip r:embed="rId6">
+            <a:alphaModFix/>
+          </a:blip>
+          <a:stretch>
+            <a:fillRect/>
+          </a:stretch>
+        </p:blipFill>
+        <p:spPr>
+          <a:xfrm>
+            <a:off x="4783675" y="1912988"/>
+            <a:ext cx="2865975" cy="1317526"/>
+          </a:xfrm>
+          <a:prstGeom prst="rect">
+            <a:avLst/>
+          </a:prstGeom>
+          <a:noFill/>
+          <a:ln>
+            <a:noFill/>
+          </a:ln>
+        </p:spPr>
+      </p:pic>
+      <p:pic>
+        <p:nvPicPr>
+          <p:cNvPr id="487" name="Google Shape;487;p49"/>
+          <p:cNvPicPr preferRelativeResize="0"/>
+          <p:nvPr/>
+        </p:nvPicPr>
+        <p:blipFill>
+          <a:blip r:embed="rId7">
+            <a:alphaModFix/>
+          </a:blip>
+          <a:stretch>
+            <a:fillRect/>
+          </a:stretch>
+        </p:blipFill>
+        <p:spPr>
+          <a:xfrm>
+            <a:off x="4783675" y="3285325"/>
+            <a:ext cx="3965537" cy="1669700"/>
+          </a:xfrm>
+          <a:prstGeom prst="rect">
+            <a:avLst/>
+          </a:prstGeom>
+          <a:noFill/>
+          <a:ln>
+            <a:noFill/>
+          </a:ln>
+        </p:spPr>
+      </p:pic>
     </p:spTree>
   </p:cSld>
   <p:clrMapOvr>
@@ -22173,7 +22509,7 @@
   <p:cSld>
     <p:spTree>
       <p:nvGrpSpPr>
-        <p:cNvPr id="479" name="Shape 479"/>
+        <p:cNvPr id="491" name="Shape 491"/>
         <p:cNvGrpSpPr/>
         <p:nvPr/>
       </p:nvGrpSpPr>
@@ -22187,7 +22523,7 @@
       </p:grpSpPr>
       <p:sp>
         <p:nvSpPr>
-          <p:cNvPr id="480" name="Google Shape;480;p50"/>
+          <p:cNvPr id="492" name="Google Shape;492;p50"/>
           <p:cNvSpPr txBox="1"/>
           <p:nvPr/>
         </p:nvSpPr>
@@ -22234,7 +22570,7 @@
       </p:sp>
       <p:sp>
         <p:nvSpPr>
-          <p:cNvPr id="481" name="Google Shape;481;p50"/>
+          <p:cNvPr id="493" name="Google Shape;493;p50"/>
           <p:cNvSpPr txBox="1"/>
           <p:nvPr>
             <p:ph idx="1" type="body"/>
@@ -22277,7 +22613,7 @@
       </p:sp>
       <p:sp>
         <p:nvSpPr>
-          <p:cNvPr id="482" name="Google Shape;482;p50"/>
+          <p:cNvPr id="494" name="Google Shape;494;p50"/>
           <p:cNvSpPr txBox="1"/>
           <p:nvPr>
             <p:ph idx="1" type="body"/>
@@ -22323,7 +22659,7 @@
       </p:sp>
       <p:sp>
         <p:nvSpPr>
-          <p:cNvPr id="483" name="Google Shape;483;p50"/>
+          <p:cNvPr id="495" name="Google Shape;495;p50"/>
           <p:cNvSpPr txBox="1"/>
           <p:nvPr>
             <p:ph idx="1" type="body"/>
@@ -22366,7 +22702,7 @@
       </p:sp>
       <p:sp>
         <p:nvSpPr>
-          <p:cNvPr id="484" name="Google Shape;484;p50"/>
+          <p:cNvPr id="496" name="Google Shape;496;p50"/>
           <p:cNvSpPr txBox="1"/>
           <p:nvPr>
             <p:ph type="title"/>
@@ -22406,7 +22742,7 @@
       </p:sp>
       <p:sp>
         <p:nvSpPr>
-          <p:cNvPr id="485" name="Google Shape;485;p50"/>
+          <p:cNvPr id="497" name="Google Shape;497;p50"/>
           <p:cNvSpPr txBox="1"/>
           <p:nvPr/>
         </p:nvSpPr>
@@ -22459,7 +22795,7 @@
       </p:sp>
       <p:sp>
         <p:nvSpPr>
-          <p:cNvPr id="486" name="Google Shape;486;p50"/>
+          <p:cNvPr id="498" name="Google Shape;498;p50"/>
           <p:cNvSpPr/>
           <p:nvPr/>
         </p:nvSpPr>
@@ -22512,7 +22848,7 @@
       </p:sp>
       <p:sp>
         <p:nvSpPr>
-          <p:cNvPr id="487" name="Google Shape;487;p50"/>
+          <p:cNvPr id="499" name="Google Shape;499;p50"/>
           <p:cNvSpPr/>
           <p:nvPr/>
         </p:nvSpPr>
@@ -22565,7 +22901,7 @@
       </p:sp>
       <p:sp>
         <p:nvSpPr>
-          <p:cNvPr id="488" name="Google Shape;488;p50"/>
+          <p:cNvPr id="500" name="Google Shape;500;p50"/>
           <p:cNvSpPr/>
           <p:nvPr/>
         </p:nvSpPr>
@@ -22618,7 +22954,7 @@
       </p:sp>
       <p:sp>
         <p:nvSpPr>
-          <p:cNvPr id="489" name="Google Shape;489;p50"/>
+          <p:cNvPr id="501" name="Google Shape;501;p50"/>
           <p:cNvSpPr txBox="1"/>
           <p:nvPr/>
         </p:nvSpPr>
@@ -22671,7 +23007,7 @@
       </p:sp>
       <p:sp>
         <p:nvSpPr>
-          <p:cNvPr id="490" name="Google Shape;490;p50"/>
+          <p:cNvPr id="502" name="Google Shape;502;p50"/>
           <p:cNvSpPr txBox="1"/>
           <p:nvPr/>
         </p:nvSpPr>
@@ -22724,7 +23060,7 @@
       </p:sp>
       <p:sp>
         <p:nvSpPr>
-          <p:cNvPr id="491" name="Google Shape;491;p50"/>
+          <p:cNvPr id="503" name="Google Shape;503;p50"/>
           <p:cNvSpPr txBox="1"/>
           <p:nvPr/>
         </p:nvSpPr>
@@ -22777,7 +23113,7 @@
       </p:sp>
       <p:sp>
         <p:nvSpPr>
-          <p:cNvPr id="492" name="Google Shape;492;p50"/>
+          <p:cNvPr id="504" name="Google Shape;504;p50"/>
           <p:cNvSpPr/>
           <p:nvPr/>
         </p:nvSpPr>
@@ -22828,6 +23164,62 @@
           </a:p>
         </p:txBody>
       </p:sp>
+      <p:pic>
+        <p:nvPicPr>
+          <p:cNvPr id="505" name="Google Shape;505;p50"/>
+          <p:cNvPicPr preferRelativeResize="0"/>
+          <p:nvPr/>
+        </p:nvPicPr>
+        <p:blipFill>
+          <a:blip r:embed="rId5">
+            <a:alphaModFix/>
+          </a:blip>
+          <a:stretch>
+            <a:fillRect/>
+          </a:stretch>
+        </p:blipFill>
+        <p:spPr>
+          <a:xfrm>
+            <a:off x="4961625" y="2004525"/>
+            <a:ext cx="2888200" cy="1478950"/>
+          </a:xfrm>
+          <a:prstGeom prst="rect">
+            <a:avLst/>
+          </a:prstGeom>
+          <a:noFill/>
+          <a:ln>
+            <a:noFill/>
+          </a:ln>
+        </p:spPr>
+      </p:pic>
+      <p:pic>
+        <p:nvPicPr>
+          <p:cNvPr id="506" name="Google Shape;506;p50"/>
+          <p:cNvPicPr preferRelativeResize="0"/>
+          <p:nvPr/>
+        </p:nvPicPr>
+        <p:blipFill>
+          <a:blip r:embed="rId6">
+            <a:alphaModFix/>
+          </a:blip>
+          <a:stretch>
+            <a:fillRect/>
+          </a:stretch>
+        </p:blipFill>
+        <p:spPr>
+          <a:xfrm>
+            <a:off x="4961613" y="3583200"/>
+            <a:ext cx="3571875" cy="1057275"/>
+          </a:xfrm>
+          <a:prstGeom prst="rect">
+            <a:avLst/>
+          </a:prstGeom>
+          <a:noFill/>
+          <a:ln>
+            <a:noFill/>
+          </a:ln>
+        </p:spPr>
+      </p:pic>
     </p:spTree>
   </p:cSld>
   <p:clrMapOvr>
@@ -22841,7 +23233,7 @@
   <p:cSld>
     <p:spTree>
       <p:nvGrpSpPr>
-        <p:cNvPr id="496" name="Shape 496"/>
+        <p:cNvPr id="510" name="Shape 510"/>
         <p:cNvGrpSpPr/>
         <p:nvPr/>
       </p:nvGrpSpPr>
@@ -22855,7 +23247,7 @@
       </p:grpSpPr>
       <p:sp>
         <p:nvSpPr>
-          <p:cNvPr id="497" name="Google Shape;497;p51"/>
+          <p:cNvPr id="511" name="Google Shape;511;p51"/>
           <p:cNvSpPr txBox="1"/>
           <p:nvPr>
             <p:ph type="title"/>
@@ -22895,7 +23287,7 @@
       </p:sp>
       <p:sp>
         <p:nvSpPr>
-          <p:cNvPr id="498" name="Google Shape;498;p51"/>
+          <p:cNvPr id="512" name="Google Shape;512;p51"/>
           <p:cNvSpPr txBox="1"/>
           <p:nvPr/>
         </p:nvSpPr>
@@ -22951,7 +23343,7 @@
       </p:sp>
       <p:sp>
         <p:nvSpPr>
-          <p:cNvPr id="499" name="Google Shape;499;p51"/>
+          <p:cNvPr id="513" name="Google Shape;513;p51"/>
           <p:cNvSpPr txBox="1"/>
           <p:nvPr/>
         </p:nvSpPr>
@@ -23004,7 +23396,7 @@
       </p:sp>
       <p:sp>
         <p:nvSpPr>
-          <p:cNvPr id="500" name="Google Shape;500;p51"/>
+          <p:cNvPr id="514" name="Google Shape;514;p51"/>
           <p:cNvSpPr/>
           <p:nvPr/>
         </p:nvSpPr>
@@ -23057,7 +23449,7 @@
       </p:sp>
       <p:sp>
         <p:nvSpPr>
-          <p:cNvPr id="501" name="Google Shape;501;p51"/>
+          <p:cNvPr id="515" name="Google Shape;515;p51"/>
           <p:cNvSpPr txBox="1"/>
           <p:nvPr>
             <p:ph idx="1" type="body"/>
@@ -23106,7 +23498,7 @@
       </p:sp>
       <p:pic>
         <p:nvPicPr>
-          <p:cNvPr id="502" name="Google Shape;502;p51"/>
+          <p:cNvPr id="516" name="Google Shape;516;p51"/>
           <p:cNvPicPr preferRelativeResize="0"/>
           <p:nvPr/>
         </p:nvPicPr>
@@ -23134,7 +23526,7 @@
       </p:pic>
       <p:pic>
         <p:nvPicPr>
-          <p:cNvPr id="503" name="Google Shape;503;p51"/>
+          <p:cNvPr id="517" name="Google Shape;517;p51"/>
           <p:cNvPicPr preferRelativeResize="0"/>
           <p:nvPr/>
         </p:nvPicPr>
@@ -23719,7 +24111,7 @@
   <p:cSld>
     <p:spTree>
       <p:nvGrpSpPr>
-        <p:cNvPr id="507" name="Shape 507"/>
+        <p:cNvPr id="521" name="Shape 521"/>
         <p:cNvGrpSpPr/>
         <p:nvPr/>
       </p:nvGrpSpPr>
@@ -23733,7 +24125,7 @@
       </p:grpSpPr>
       <p:sp>
         <p:nvSpPr>
-          <p:cNvPr id="508" name="Google Shape;508;p52"/>
+          <p:cNvPr id="522" name="Google Shape;522;p52"/>
           <p:cNvSpPr txBox="1"/>
           <p:nvPr/>
         </p:nvSpPr>
@@ -23786,7 +24178,7 @@
       </p:sp>
       <p:sp>
         <p:nvSpPr>
-          <p:cNvPr id="509" name="Google Shape;509;p52"/>
+          <p:cNvPr id="523" name="Google Shape;523;p52"/>
           <p:cNvSpPr/>
           <p:nvPr/>
         </p:nvSpPr>
@@ -23839,7 +24231,7 @@
       </p:sp>
       <p:pic>
         <p:nvPicPr>
-          <p:cNvPr id="510" name="Google Shape;510;p52"/>
+          <p:cNvPr id="524" name="Google Shape;524;p52"/>
           <p:cNvPicPr preferRelativeResize="0"/>
           <p:nvPr/>
         </p:nvPicPr>
@@ -23867,7 +24259,7 @@
       </p:pic>
       <p:pic>
         <p:nvPicPr>
-          <p:cNvPr id="511" name="Google Shape;511;p52"/>
+          <p:cNvPr id="525" name="Google Shape;525;p52"/>
           <p:cNvPicPr preferRelativeResize="0"/>
           <p:nvPr/>
         </p:nvPicPr>
@@ -23906,7 +24298,7 @@
   <p:cSld>
     <p:spTree>
       <p:nvGrpSpPr>
-        <p:cNvPr id="515" name="Shape 515"/>
+        <p:cNvPr id="529" name="Shape 529"/>
         <p:cNvGrpSpPr/>
         <p:nvPr/>
       </p:nvGrpSpPr>
@@ -23920,7 +24312,7 @@
       </p:grpSpPr>
       <p:sp>
         <p:nvSpPr>
-          <p:cNvPr id="516" name="Google Shape;516;p53"/>
+          <p:cNvPr id="530" name="Google Shape;530;p53"/>
           <p:cNvSpPr txBox="1"/>
           <p:nvPr/>
         </p:nvSpPr>
@@ -23973,7 +24365,7 @@
       </p:sp>
       <p:sp>
         <p:nvSpPr>
-          <p:cNvPr id="517" name="Google Shape;517;p53"/>
+          <p:cNvPr id="531" name="Google Shape;531;p53"/>
           <p:cNvSpPr/>
           <p:nvPr/>
         </p:nvSpPr>
@@ -24026,7 +24418,7 @@
       </p:sp>
       <p:pic>
         <p:nvPicPr>
-          <p:cNvPr id="518" name="Google Shape;518;p53"/>
+          <p:cNvPr id="532" name="Google Shape;532;p53"/>
           <p:cNvPicPr preferRelativeResize="0"/>
           <p:nvPr/>
         </p:nvPicPr>
@@ -24054,7 +24446,7 @@
       </p:pic>
       <p:pic>
         <p:nvPicPr>
-          <p:cNvPr id="519" name="Google Shape;519;p53"/>
+          <p:cNvPr id="533" name="Google Shape;533;p53"/>
           <p:cNvPicPr preferRelativeResize="0"/>
           <p:nvPr/>
         </p:nvPicPr>
@@ -24093,7 +24485,7 @@
   <p:cSld>
     <p:spTree>
       <p:nvGrpSpPr>
-        <p:cNvPr id="523" name="Shape 523"/>
+        <p:cNvPr id="537" name="Shape 537"/>
         <p:cNvGrpSpPr/>
         <p:nvPr/>
       </p:nvGrpSpPr>
@@ -24107,7 +24499,7 @@
       </p:grpSpPr>
       <p:sp>
         <p:nvSpPr>
-          <p:cNvPr id="524" name="Google Shape;524;p54"/>
+          <p:cNvPr id="538" name="Google Shape;538;p54"/>
           <p:cNvSpPr txBox="1"/>
           <p:nvPr/>
         </p:nvSpPr>
@@ -24154,7 +24546,7 @@
       </p:sp>
       <p:sp>
         <p:nvSpPr>
-          <p:cNvPr id="525" name="Google Shape;525;p54"/>
+          <p:cNvPr id="539" name="Google Shape;539;p54"/>
           <p:cNvSpPr txBox="1"/>
           <p:nvPr>
             <p:ph idx="1" type="body"/>
@@ -24197,7 +24589,7 @@
       </p:sp>
       <p:sp>
         <p:nvSpPr>
-          <p:cNvPr id="526" name="Google Shape;526;p54"/>
+          <p:cNvPr id="540" name="Google Shape;540;p54"/>
           <p:cNvSpPr txBox="1"/>
           <p:nvPr>
             <p:ph idx="1" type="body"/>
@@ -24243,7 +24635,7 @@
       </p:sp>
       <p:sp>
         <p:nvSpPr>
-          <p:cNvPr id="527" name="Google Shape;527;p54"/>
+          <p:cNvPr id="541" name="Google Shape;541;p54"/>
           <p:cNvSpPr txBox="1"/>
           <p:nvPr>
             <p:ph idx="1" type="body"/>
@@ -24286,7 +24678,7 @@
       </p:sp>
       <p:sp>
         <p:nvSpPr>
-          <p:cNvPr id="528" name="Google Shape;528;p54"/>
+          <p:cNvPr id="542" name="Google Shape;542;p54"/>
           <p:cNvSpPr txBox="1"/>
           <p:nvPr>
             <p:ph type="title"/>
@@ -24326,7 +24718,7 @@
       </p:sp>
       <p:sp>
         <p:nvSpPr>
-          <p:cNvPr id="529" name="Google Shape;529;p54"/>
+          <p:cNvPr id="543" name="Google Shape;543;p54"/>
           <p:cNvSpPr txBox="1"/>
           <p:nvPr/>
         </p:nvSpPr>
@@ -24379,7 +24771,7 @@
       </p:sp>
       <p:sp>
         <p:nvSpPr>
-          <p:cNvPr id="530" name="Google Shape;530;p54"/>
+          <p:cNvPr id="544" name="Google Shape;544;p54"/>
           <p:cNvSpPr/>
           <p:nvPr/>
         </p:nvSpPr>
@@ -24432,7 +24824,7 @@
       </p:sp>
       <p:sp>
         <p:nvSpPr>
-          <p:cNvPr id="531" name="Google Shape;531;p54"/>
+          <p:cNvPr id="545" name="Google Shape;545;p54"/>
           <p:cNvSpPr/>
           <p:nvPr/>
         </p:nvSpPr>
@@ -24485,7 +24877,7 @@
       </p:sp>
       <p:sp>
         <p:nvSpPr>
-          <p:cNvPr id="532" name="Google Shape;532;p54"/>
+          <p:cNvPr id="546" name="Google Shape;546;p54"/>
           <p:cNvSpPr/>
           <p:nvPr/>
         </p:nvSpPr>
@@ -24538,7 +24930,7 @@
       </p:sp>
       <p:sp>
         <p:nvSpPr>
-          <p:cNvPr id="533" name="Google Shape;533;p54"/>
+          <p:cNvPr id="547" name="Google Shape;547;p54"/>
           <p:cNvSpPr txBox="1"/>
           <p:nvPr/>
         </p:nvSpPr>
@@ -24591,7 +24983,7 @@
       </p:sp>
       <p:sp>
         <p:nvSpPr>
-          <p:cNvPr id="534" name="Google Shape;534;p54"/>
+          <p:cNvPr id="548" name="Google Shape;548;p54"/>
           <p:cNvSpPr txBox="1"/>
           <p:nvPr/>
         </p:nvSpPr>
@@ -24642,6 +25034,62 @@
           </a:p>
         </p:txBody>
       </p:sp>
+      <p:pic>
+        <p:nvPicPr>
+          <p:cNvPr id="549" name="Google Shape;549;p54"/>
+          <p:cNvPicPr preferRelativeResize="0"/>
+          <p:nvPr/>
+        </p:nvPicPr>
+        <p:blipFill>
+          <a:blip r:embed="rId5">
+            <a:alphaModFix/>
+          </a:blip>
+          <a:stretch>
+            <a:fillRect/>
+          </a:stretch>
+        </p:blipFill>
+        <p:spPr>
+          <a:xfrm>
+            <a:off x="3953623" y="1858885"/>
+            <a:ext cx="4971975" cy="919855"/>
+          </a:xfrm>
+          <a:prstGeom prst="rect">
+            <a:avLst/>
+          </a:prstGeom>
+          <a:noFill/>
+          <a:ln>
+            <a:noFill/>
+          </a:ln>
+        </p:spPr>
+      </p:pic>
+      <p:pic>
+        <p:nvPicPr>
+          <p:cNvPr id="550" name="Google Shape;550;p54"/>
+          <p:cNvPicPr preferRelativeResize="0"/>
+          <p:nvPr/>
+        </p:nvPicPr>
+        <p:blipFill>
+          <a:blip r:embed="rId6">
+            <a:alphaModFix/>
+          </a:blip>
+          <a:stretch>
+            <a:fillRect/>
+          </a:stretch>
+        </p:blipFill>
+        <p:spPr>
+          <a:xfrm>
+            <a:off x="5267900" y="2895323"/>
+            <a:ext cx="3657700" cy="1673200"/>
+          </a:xfrm>
+          <a:prstGeom prst="rect">
+            <a:avLst/>
+          </a:prstGeom>
+          <a:noFill/>
+          <a:ln>
+            <a:noFill/>
+          </a:ln>
+        </p:spPr>
+      </p:pic>
     </p:spTree>
   </p:cSld>
   <p:clrMapOvr>
@@ -24655,7 +25103,7 @@
   <p:cSld>
     <p:spTree>
       <p:nvGrpSpPr>
-        <p:cNvPr id="538" name="Shape 538"/>
+        <p:cNvPr id="554" name="Shape 554"/>
         <p:cNvGrpSpPr/>
         <p:nvPr/>
       </p:nvGrpSpPr>
@@ -24669,7 +25117,7 @@
       </p:grpSpPr>
       <p:sp>
         <p:nvSpPr>
-          <p:cNvPr id="539" name="Google Shape;539;p55"/>
+          <p:cNvPr id="555" name="Google Shape;555;p55"/>
           <p:cNvSpPr txBox="1"/>
           <p:nvPr/>
         </p:nvSpPr>
@@ -24716,7 +25164,7 @@
       </p:sp>
       <p:sp>
         <p:nvSpPr>
-          <p:cNvPr id="540" name="Google Shape;540;p55"/>
+          <p:cNvPr id="556" name="Google Shape;556;p55"/>
           <p:cNvSpPr txBox="1"/>
           <p:nvPr>
             <p:ph idx="1" type="body"/>
@@ -24759,7 +25207,7 @@
       </p:sp>
       <p:sp>
         <p:nvSpPr>
-          <p:cNvPr id="541" name="Google Shape;541;p55"/>
+          <p:cNvPr id="557" name="Google Shape;557;p55"/>
           <p:cNvSpPr txBox="1"/>
           <p:nvPr>
             <p:ph idx="1" type="body"/>
@@ -24805,7 +25253,7 @@
       </p:sp>
       <p:sp>
         <p:nvSpPr>
-          <p:cNvPr id="542" name="Google Shape;542;p55"/>
+          <p:cNvPr id="558" name="Google Shape;558;p55"/>
           <p:cNvSpPr txBox="1"/>
           <p:nvPr>
             <p:ph idx="1" type="body"/>
@@ -24848,7 +25296,7 @@
       </p:sp>
       <p:sp>
         <p:nvSpPr>
-          <p:cNvPr id="543" name="Google Shape;543;p55"/>
+          <p:cNvPr id="559" name="Google Shape;559;p55"/>
           <p:cNvSpPr txBox="1"/>
           <p:nvPr>
             <p:ph type="title"/>
@@ -24888,7 +25336,7 @@
       </p:sp>
       <p:sp>
         <p:nvSpPr>
-          <p:cNvPr id="544" name="Google Shape;544;p55"/>
+          <p:cNvPr id="560" name="Google Shape;560;p55"/>
           <p:cNvSpPr txBox="1"/>
           <p:nvPr/>
         </p:nvSpPr>
@@ -24941,7 +25389,7 @@
       </p:sp>
       <p:sp>
         <p:nvSpPr>
-          <p:cNvPr id="545" name="Google Shape;545;p55"/>
+          <p:cNvPr id="561" name="Google Shape;561;p55"/>
           <p:cNvSpPr/>
           <p:nvPr/>
         </p:nvSpPr>
@@ -24994,7 +25442,7 @@
       </p:sp>
       <p:sp>
         <p:nvSpPr>
-          <p:cNvPr id="546" name="Google Shape;546;p55"/>
+          <p:cNvPr id="562" name="Google Shape;562;p55"/>
           <p:cNvSpPr/>
           <p:nvPr/>
         </p:nvSpPr>
@@ -25047,7 +25495,7 @@
       </p:sp>
       <p:sp>
         <p:nvSpPr>
-          <p:cNvPr id="547" name="Google Shape;547;p55"/>
+          <p:cNvPr id="563" name="Google Shape;563;p55"/>
           <p:cNvSpPr/>
           <p:nvPr/>
         </p:nvSpPr>
@@ -25100,7 +25548,7 @@
       </p:sp>
       <p:sp>
         <p:nvSpPr>
-          <p:cNvPr id="548" name="Google Shape;548;p55"/>
+          <p:cNvPr id="564" name="Google Shape;564;p55"/>
           <p:cNvSpPr txBox="1"/>
           <p:nvPr/>
         </p:nvSpPr>
@@ -25153,7 +25601,7 @@
       </p:sp>
       <p:sp>
         <p:nvSpPr>
-          <p:cNvPr id="549" name="Google Shape;549;p55"/>
+          <p:cNvPr id="565" name="Google Shape;565;p55"/>
           <p:cNvSpPr txBox="1"/>
           <p:nvPr/>
         </p:nvSpPr>
@@ -25204,6 +25652,34 @@
           </a:p>
         </p:txBody>
       </p:sp>
+      <p:pic>
+        <p:nvPicPr>
+          <p:cNvPr id="566" name="Google Shape;566;p55"/>
+          <p:cNvPicPr preferRelativeResize="0"/>
+          <p:nvPr/>
+        </p:nvPicPr>
+        <p:blipFill>
+          <a:blip r:embed="rId5">
+            <a:alphaModFix/>
+          </a:blip>
+          <a:stretch>
+            <a:fillRect/>
+          </a:stretch>
+        </p:blipFill>
+        <p:spPr>
+          <a:xfrm>
+            <a:off x="5396904" y="3098450"/>
+            <a:ext cx="3485446" cy="904332"/>
+          </a:xfrm>
+          <a:prstGeom prst="rect">
+            <a:avLst/>
+          </a:prstGeom>
+          <a:noFill/>
+          <a:ln>
+            <a:noFill/>
+          </a:ln>
+        </p:spPr>
+      </p:pic>
     </p:spTree>
   </p:cSld>
   <p:clrMapOvr>
@@ -25217,7 +25693,7 @@
   <p:cSld>
     <p:spTree>
       <p:nvGrpSpPr>
-        <p:cNvPr id="553" name="Shape 553"/>
+        <p:cNvPr id="570" name="Shape 570"/>
         <p:cNvGrpSpPr/>
         <p:nvPr/>
       </p:nvGrpSpPr>
@@ -25231,7 +25707,7 @@
       </p:grpSpPr>
       <p:pic>
         <p:nvPicPr>
-          <p:cNvPr id="554" name="Google Shape;554;p56"/>
+          <p:cNvPr id="571" name="Google Shape;571;p56"/>
           <p:cNvPicPr preferRelativeResize="0"/>
           <p:nvPr/>
         </p:nvPicPr>
@@ -25259,7 +25735,7 @@
       </p:pic>
       <p:sp>
         <p:nvSpPr>
-          <p:cNvPr id="555" name="Google Shape;555;p56"/>
+          <p:cNvPr id="572" name="Google Shape;572;p56"/>
           <p:cNvSpPr txBox="1"/>
           <p:nvPr>
             <p:ph type="title"/>
@@ -25299,7 +25775,7 @@
       </p:sp>
       <p:sp>
         <p:nvSpPr>
-          <p:cNvPr id="556" name="Google Shape;556;p56"/>
+          <p:cNvPr id="573" name="Google Shape;573;p56"/>
           <p:cNvSpPr txBox="1"/>
           <p:nvPr/>
         </p:nvSpPr>
@@ -25355,7 +25831,7 @@
       </p:sp>
       <p:sp>
         <p:nvSpPr>
-          <p:cNvPr id="557" name="Google Shape;557;p56"/>
+          <p:cNvPr id="574" name="Google Shape;574;p56"/>
           <p:cNvSpPr txBox="1"/>
           <p:nvPr/>
         </p:nvSpPr>
@@ -25408,7 +25884,7 @@
       </p:sp>
       <p:sp>
         <p:nvSpPr>
-          <p:cNvPr id="558" name="Google Shape;558;p56"/>
+          <p:cNvPr id="575" name="Google Shape;575;p56"/>
           <p:cNvSpPr/>
           <p:nvPr/>
         </p:nvSpPr>
@@ -25461,7 +25937,7 @@
       </p:sp>
       <p:sp>
         <p:nvSpPr>
-          <p:cNvPr id="559" name="Google Shape;559;p56"/>
+          <p:cNvPr id="576" name="Google Shape;576;p56"/>
           <p:cNvSpPr txBox="1"/>
           <p:nvPr>
             <p:ph idx="1" type="body"/>
@@ -25510,7 +25986,7 @@
       </p:sp>
       <p:pic>
         <p:nvPicPr>
-          <p:cNvPr id="560" name="Google Shape;560;p56"/>
+          <p:cNvPr id="577" name="Google Shape;577;p56"/>
           <p:cNvPicPr preferRelativeResize="0"/>
           <p:nvPr/>
         </p:nvPicPr>
@@ -25538,7 +26014,7 @@
       </p:pic>
       <p:sp>
         <p:nvSpPr>
-          <p:cNvPr id="561" name="Google Shape;561;p56"/>
+          <p:cNvPr id="578" name="Google Shape;578;p56"/>
           <p:cNvSpPr/>
           <p:nvPr/>
         </p:nvSpPr>
@@ -25601,7 +26077,7 @@
   <p:cSld>
     <p:spTree>
       <p:nvGrpSpPr>
-        <p:cNvPr id="565" name="Shape 565"/>
+        <p:cNvPr id="582" name="Shape 582"/>
         <p:cNvGrpSpPr/>
         <p:nvPr/>
       </p:nvGrpSpPr>
@@ -25615,7 +26091,7 @@
       </p:grpSpPr>
       <p:sp>
         <p:nvSpPr>
-          <p:cNvPr id="566" name="Google Shape;566;p57"/>
+          <p:cNvPr id="583" name="Google Shape;583;p57"/>
           <p:cNvSpPr txBox="1"/>
           <p:nvPr>
             <p:ph idx="1" type="body"/>
@@ -25661,7 +26137,7 @@
       </p:sp>
       <p:sp>
         <p:nvSpPr>
-          <p:cNvPr id="567" name="Google Shape;567;p57"/>
+          <p:cNvPr id="584" name="Google Shape;584;p57"/>
           <p:cNvSpPr txBox="1"/>
           <p:nvPr>
             <p:ph idx="1" type="body"/>
@@ -25708,7 +26184,7 @@
       </p:sp>
       <p:pic>
         <p:nvPicPr>
-          <p:cNvPr id="568" name="Google Shape;568;p57"/>
+          <p:cNvPr id="585" name="Google Shape;585;p57"/>
           <p:cNvPicPr preferRelativeResize="0"/>
           <p:nvPr/>
         </p:nvPicPr>
@@ -25736,7 +26212,7 @@
       </p:pic>
       <p:pic>
         <p:nvPicPr>
-          <p:cNvPr id="569" name="Google Shape;569;p57"/>
+          <p:cNvPr id="586" name="Google Shape;586;p57"/>
           <p:cNvPicPr preferRelativeResize="0"/>
           <p:nvPr/>
         </p:nvPicPr>
@@ -25764,7 +26240,7 @@
       </p:pic>
       <p:pic>
         <p:nvPicPr>
-          <p:cNvPr id="570" name="Google Shape;570;p57"/>
+          <p:cNvPr id="587" name="Google Shape;587;p57"/>
           <p:cNvPicPr preferRelativeResize="0"/>
           <p:nvPr/>
         </p:nvPicPr>
@@ -25803,7 +26279,7 @@
   <p:cSld>
     <p:spTree>
       <p:nvGrpSpPr>
-        <p:cNvPr id="574" name="Shape 574"/>
+        <p:cNvPr id="591" name="Shape 591"/>
         <p:cNvGrpSpPr/>
         <p:nvPr/>
       </p:nvGrpSpPr>
@@ -25817,7 +26293,7 @@
       </p:grpSpPr>
       <p:sp>
         <p:nvSpPr>
-          <p:cNvPr id="575" name="Google Shape;575;p58"/>
+          <p:cNvPr id="592" name="Google Shape;592;p58"/>
           <p:cNvSpPr txBox="1"/>
           <p:nvPr/>
         </p:nvSpPr>
@@ -25870,7 +26346,7 @@
       </p:sp>
       <p:sp>
         <p:nvSpPr>
-          <p:cNvPr id="576" name="Google Shape;576;p58"/>
+          <p:cNvPr id="593" name="Google Shape;593;p58"/>
           <p:cNvSpPr/>
           <p:nvPr/>
         </p:nvSpPr>
@@ -25923,7 +26399,7 @@
       </p:sp>
       <p:pic>
         <p:nvPicPr>
-          <p:cNvPr id="577" name="Google Shape;577;p58"/>
+          <p:cNvPr id="594" name="Google Shape;594;p58"/>
           <p:cNvPicPr preferRelativeResize="0"/>
           <p:nvPr/>
         </p:nvPicPr>
@@ -25951,7 +26427,7 @@
       </p:pic>
       <p:sp>
         <p:nvSpPr>
-          <p:cNvPr id="578" name="Google Shape;578;p58"/>
+          <p:cNvPr id="595" name="Google Shape;595;p58"/>
           <p:cNvSpPr/>
           <p:nvPr/>
         </p:nvSpPr>
@@ -26003,7 +26479,7 @@
       </p:sp>
       <p:pic>
         <p:nvPicPr>
-          <p:cNvPr id="579" name="Google Shape;579;p58"/>
+          <p:cNvPr id="596" name="Google Shape;596;p58"/>
           <p:cNvPicPr preferRelativeResize="0"/>
           <p:nvPr/>
         </p:nvPicPr>
@@ -26031,7 +26507,7 @@
       </p:pic>
       <p:pic>
         <p:nvPicPr>
-          <p:cNvPr id="580" name="Google Shape;580;p58"/>
+          <p:cNvPr id="597" name="Google Shape;597;p58"/>
           <p:cNvPicPr preferRelativeResize="0"/>
           <p:nvPr/>
         </p:nvPicPr>
@@ -26059,7 +26535,7 @@
       </p:pic>
       <p:sp>
         <p:nvSpPr>
-          <p:cNvPr id="581" name="Google Shape;581;p58"/>
+          <p:cNvPr id="598" name="Google Shape;598;p58"/>
           <p:cNvSpPr txBox="1"/>
           <p:nvPr>
             <p:ph idx="1" type="body"/>
@@ -26105,7 +26581,7 @@
       </p:sp>
       <p:sp>
         <p:nvSpPr>
-          <p:cNvPr id="582" name="Google Shape;582;p58"/>
+          <p:cNvPr id="599" name="Google Shape;599;p58"/>
           <p:cNvSpPr txBox="1"/>
           <p:nvPr>
             <p:ph idx="1" type="body"/>
@@ -26163,7 +26639,7 @@
   <p:cSld>
     <p:spTree>
       <p:nvGrpSpPr>
-        <p:cNvPr id="586" name="Shape 586"/>
+        <p:cNvPr id="603" name="Shape 603"/>
         <p:cNvGrpSpPr/>
         <p:nvPr/>
       </p:nvGrpSpPr>
@@ -26177,7 +26653,7 @@
       </p:grpSpPr>
       <p:pic>
         <p:nvPicPr>
-          <p:cNvPr id="587" name="Google Shape;587;p59"/>
+          <p:cNvPr id="604" name="Google Shape;604;p59"/>
           <p:cNvPicPr preferRelativeResize="0"/>
           <p:nvPr/>
         </p:nvPicPr>
@@ -26205,7 +26681,7 @@
       </p:pic>
       <p:pic>
         <p:nvPicPr>
-          <p:cNvPr id="588" name="Google Shape;588;p59"/>
+          <p:cNvPr id="605" name="Google Shape;605;p59"/>
           <p:cNvPicPr preferRelativeResize="0"/>
           <p:nvPr/>
         </p:nvPicPr>
@@ -26233,7 +26709,7 @@
       </p:pic>
       <p:pic>
         <p:nvPicPr>
-          <p:cNvPr id="589" name="Google Shape;589;p59"/>
+          <p:cNvPr id="606" name="Google Shape;606;p59"/>
           <p:cNvPicPr preferRelativeResize="0"/>
           <p:nvPr/>
         </p:nvPicPr>
@@ -26261,7 +26737,7 @@
       </p:pic>
       <p:pic>
         <p:nvPicPr>
-          <p:cNvPr id="590" name="Google Shape;590;p59"/>
+          <p:cNvPr id="607" name="Google Shape;607;p59"/>
           <p:cNvPicPr preferRelativeResize="0"/>
           <p:nvPr/>
         </p:nvPicPr>
@@ -26300,7 +26776,7 @@
   <p:cSld>
     <p:spTree>
       <p:nvGrpSpPr>
-        <p:cNvPr id="594" name="Shape 594"/>
+        <p:cNvPr id="611" name="Shape 611"/>
         <p:cNvGrpSpPr/>
         <p:nvPr/>
       </p:nvGrpSpPr>
@@ -26314,7 +26790,7 @@
       </p:grpSpPr>
       <p:sp>
         <p:nvSpPr>
-          <p:cNvPr id="595" name="Google Shape;595;p60"/>
+          <p:cNvPr id="612" name="Google Shape;612;p60"/>
           <p:cNvSpPr txBox="1"/>
           <p:nvPr/>
         </p:nvSpPr>
@@ -26370,7 +26846,7 @@
       </p:sp>
       <p:sp>
         <p:nvSpPr>
-          <p:cNvPr id="596" name="Google Shape;596;p60"/>
+          <p:cNvPr id="613" name="Google Shape;613;p60"/>
           <p:cNvSpPr txBox="1"/>
           <p:nvPr>
             <p:ph idx="1" type="body"/>
@@ -26413,7 +26889,7 @@
       </p:sp>
       <p:sp>
         <p:nvSpPr>
-          <p:cNvPr id="597" name="Google Shape;597;p60"/>
+          <p:cNvPr id="614" name="Google Shape;614;p60"/>
           <p:cNvSpPr txBox="1"/>
           <p:nvPr>
             <p:ph idx="1" type="body"/>
@@ -26459,7 +26935,7 @@
       </p:sp>
       <p:sp>
         <p:nvSpPr>
-          <p:cNvPr id="598" name="Google Shape;598;p60"/>
+          <p:cNvPr id="615" name="Google Shape;615;p60"/>
           <p:cNvSpPr txBox="1"/>
           <p:nvPr>
             <p:ph idx="1" type="body"/>
@@ -26502,7 +26978,7 @@
       </p:sp>
       <p:sp>
         <p:nvSpPr>
-          <p:cNvPr id="599" name="Google Shape;599;p60"/>
+          <p:cNvPr id="616" name="Google Shape;616;p60"/>
           <p:cNvSpPr txBox="1"/>
           <p:nvPr>
             <p:ph type="title"/>
@@ -26542,14 +27018,14 @@
       </p:sp>
       <p:sp>
         <p:nvSpPr>
-          <p:cNvPr id="600" name="Google Shape;600;p60"/>
+          <p:cNvPr id="617" name="Google Shape;617;p60"/>
           <p:cNvSpPr txBox="1"/>
           <p:nvPr/>
         </p:nvSpPr>
         <p:spPr>
           <a:xfrm>
-            <a:off x="1327425" y="2798400"/>
-            <a:ext cx="5085300" cy="461700"/>
+            <a:off x="1327425" y="2646000"/>
+            <a:ext cx="3303600" cy="780300"/>
           </a:xfrm>
           <a:prstGeom prst="rect">
             <a:avLst/>
@@ -26595,7 +27071,7 @@
       </p:sp>
       <p:sp>
         <p:nvSpPr>
-          <p:cNvPr id="601" name="Google Shape;601;p60"/>
+          <p:cNvPr id="618" name="Google Shape;618;p60"/>
           <p:cNvSpPr/>
           <p:nvPr/>
         </p:nvSpPr>
@@ -26648,18 +27124,18 @@
       </p:sp>
       <p:sp>
         <p:nvSpPr>
-          <p:cNvPr id="602" name="Google Shape;602;p60"/>
+          <p:cNvPr id="619" name="Google Shape;619;p60"/>
           <p:cNvSpPr/>
           <p:nvPr/>
         </p:nvSpPr>
         <p:spPr>
           <a:xfrm rot="5400000">
-            <a:off x="578326" y="2979054"/>
-            <a:ext cx="551100" cy="789900"/>
+            <a:off x="499575" y="3052724"/>
+            <a:ext cx="708600" cy="789900"/>
           </a:xfrm>
           <a:prstGeom prst="bentUpArrow">
             <a:avLst>
-              <a:gd fmla="val 25000" name="adj1"/>
+              <a:gd fmla="val 19457" name="adj1"/>
               <a:gd fmla="val 25000" name="adj2"/>
               <a:gd fmla="val 25000" name="adj3"/>
             </a:avLst>
@@ -26701,13 +27177,13 @@
       </p:sp>
       <p:sp>
         <p:nvSpPr>
-          <p:cNvPr id="603" name="Google Shape;603;p60"/>
+          <p:cNvPr id="620" name="Google Shape;620;p60"/>
           <p:cNvSpPr txBox="1"/>
           <p:nvPr/>
         </p:nvSpPr>
         <p:spPr>
           <a:xfrm>
-            <a:off x="1327454" y="3285325"/>
+            <a:off x="1327454" y="3386738"/>
             <a:ext cx="4026300" cy="461700"/>
           </a:xfrm>
           <a:prstGeom prst="rect">
@@ -26752,6 +27228,34 @@
           </a:p>
         </p:txBody>
       </p:sp>
+      <p:pic>
+        <p:nvPicPr>
+          <p:cNvPr id="621" name="Google Shape;621;p60"/>
+          <p:cNvPicPr preferRelativeResize="0"/>
+          <p:nvPr/>
+        </p:nvPicPr>
+        <p:blipFill>
+          <a:blip r:embed="rId6">
+            <a:alphaModFix/>
+          </a:blip>
+          <a:stretch>
+            <a:fillRect/>
+          </a:stretch>
+        </p:blipFill>
+        <p:spPr>
+          <a:xfrm>
+            <a:off x="4571996" y="2599988"/>
+            <a:ext cx="4281250" cy="1596825"/>
+          </a:xfrm>
+          <a:prstGeom prst="rect">
+            <a:avLst/>
+          </a:prstGeom>
+          <a:noFill/>
+          <a:ln>
+            <a:noFill/>
+          </a:ln>
+        </p:spPr>
+      </p:pic>
     </p:spTree>
   </p:cSld>
   <p:clrMapOvr>
@@ -26765,7 +27269,7 @@
   <p:cSld>
     <p:spTree>
       <p:nvGrpSpPr>
-        <p:cNvPr id="607" name="Shape 607"/>
+        <p:cNvPr id="625" name="Shape 625"/>
         <p:cNvGrpSpPr/>
         <p:nvPr/>
       </p:nvGrpSpPr>
@@ -26779,7 +27283,7 @@
       </p:grpSpPr>
       <p:sp>
         <p:nvSpPr>
-          <p:cNvPr id="608" name="Google Shape;608;p61"/>
+          <p:cNvPr id="626" name="Google Shape;626;p61"/>
           <p:cNvSpPr txBox="1"/>
           <p:nvPr/>
         </p:nvSpPr>
@@ -26826,7 +27330,7 @@
       </p:sp>
       <p:sp>
         <p:nvSpPr>
-          <p:cNvPr id="609" name="Google Shape;609;p61"/>
+          <p:cNvPr id="627" name="Google Shape;627;p61"/>
           <p:cNvSpPr txBox="1"/>
           <p:nvPr>
             <p:ph idx="1" type="body"/>
@@ -26869,7 +27373,7 @@
       </p:sp>
       <p:sp>
         <p:nvSpPr>
-          <p:cNvPr id="610" name="Google Shape;610;p61"/>
+          <p:cNvPr id="628" name="Google Shape;628;p61"/>
           <p:cNvSpPr txBox="1"/>
           <p:nvPr>
             <p:ph idx="1" type="body"/>
@@ -26915,7 +27419,7 @@
       </p:sp>
       <p:sp>
         <p:nvSpPr>
-          <p:cNvPr id="611" name="Google Shape;611;p61"/>
+          <p:cNvPr id="629" name="Google Shape;629;p61"/>
           <p:cNvSpPr txBox="1"/>
           <p:nvPr>
             <p:ph idx="1" type="body"/>
@@ -26958,7 +27462,7 @@
       </p:sp>
       <p:sp>
         <p:nvSpPr>
-          <p:cNvPr id="612" name="Google Shape;612;p61"/>
+          <p:cNvPr id="630" name="Google Shape;630;p61"/>
           <p:cNvSpPr txBox="1"/>
           <p:nvPr>
             <p:ph type="title"/>
@@ -26998,14 +27502,14 @@
       </p:sp>
       <p:sp>
         <p:nvSpPr>
-          <p:cNvPr id="613" name="Google Shape;613;p61"/>
+          <p:cNvPr id="631" name="Google Shape;631;p61"/>
           <p:cNvSpPr txBox="1"/>
           <p:nvPr/>
         </p:nvSpPr>
         <p:spPr>
           <a:xfrm>
-            <a:off x="1327425" y="2798400"/>
-            <a:ext cx="5085300" cy="461700"/>
+            <a:off x="1327425" y="2646000"/>
+            <a:ext cx="3303600" cy="780300"/>
           </a:xfrm>
           <a:prstGeom prst="rect">
             <a:avLst/>
@@ -27051,7 +27555,7 @@
       </p:sp>
       <p:sp>
         <p:nvSpPr>
-          <p:cNvPr id="614" name="Google Shape;614;p61"/>
+          <p:cNvPr id="632" name="Google Shape;632;p61"/>
           <p:cNvSpPr/>
           <p:nvPr/>
         </p:nvSpPr>
@@ -27104,18 +27608,18 @@
       </p:sp>
       <p:sp>
         <p:nvSpPr>
-          <p:cNvPr id="615" name="Google Shape;615;p61"/>
+          <p:cNvPr id="633" name="Google Shape;633;p61"/>
           <p:cNvSpPr/>
           <p:nvPr/>
         </p:nvSpPr>
         <p:spPr>
           <a:xfrm rot="5400000">
-            <a:off x="578326" y="2979054"/>
-            <a:ext cx="551100" cy="789900"/>
+            <a:off x="499575" y="3052724"/>
+            <a:ext cx="708600" cy="789900"/>
           </a:xfrm>
           <a:prstGeom prst="bentUpArrow">
             <a:avLst>
-              <a:gd fmla="val 25000" name="adj1"/>
+              <a:gd fmla="val 19457" name="adj1"/>
               <a:gd fmla="val 25000" name="adj2"/>
               <a:gd fmla="val 25000" name="adj3"/>
             </a:avLst>
@@ -27157,13 +27661,13 @@
       </p:sp>
       <p:sp>
         <p:nvSpPr>
-          <p:cNvPr id="616" name="Google Shape;616;p61"/>
+          <p:cNvPr id="634" name="Google Shape;634;p61"/>
           <p:cNvSpPr txBox="1"/>
           <p:nvPr/>
         </p:nvSpPr>
         <p:spPr>
           <a:xfrm>
-            <a:off x="1327454" y="3285325"/>
+            <a:off x="1327454" y="3386738"/>
             <a:ext cx="4026300" cy="461700"/>
           </a:xfrm>
           <a:prstGeom prst="rect">
@@ -27208,6 +27712,34 @@
           </a:p>
         </p:txBody>
       </p:sp>
+      <p:pic>
+        <p:nvPicPr>
+          <p:cNvPr id="635" name="Google Shape;635;p61"/>
+          <p:cNvPicPr preferRelativeResize="0"/>
+          <p:nvPr/>
+        </p:nvPicPr>
+        <p:blipFill>
+          <a:blip r:embed="rId5">
+            <a:alphaModFix/>
+          </a:blip>
+          <a:stretch>
+            <a:fillRect/>
+          </a:stretch>
+        </p:blipFill>
+        <p:spPr>
+          <a:xfrm>
+            <a:off x="4631025" y="2726188"/>
+            <a:ext cx="3848100" cy="1323975"/>
+          </a:xfrm>
+          <a:prstGeom prst="rect">
+            <a:avLst/>
+          </a:prstGeom>
+          <a:noFill/>
+          <a:ln>
+            <a:noFill/>
+          </a:ln>
+        </p:spPr>
+      </p:pic>
     </p:spTree>
   </p:cSld>
   <p:clrMapOvr>
@@ -27726,7 +28258,7 @@
   <p:cSld>
     <p:spTree>
       <p:nvGrpSpPr>
-        <p:cNvPr id="620" name="Shape 620"/>
+        <p:cNvPr id="639" name="Shape 639"/>
         <p:cNvGrpSpPr/>
         <p:nvPr/>
       </p:nvGrpSpPr>
@@ -27740,7 +28272,7 @@
       </p:grpSpPr>
       <p:sp>
         <p:nvSpPr>
-          <p:cNvPr id="621" name="Google Shape;621;p62"/>
+          <p:cNvPr id="640" name="Google Shape;640;p62"/>
           <p:cNvSpPr txBox="1"/>
           <p:nvPr>
             <p:ph type="ctrTitle"/>

</xml_diff>